<commit_message>
Most of the contents roughly done.
</commit_message>
<xml_diff>
--- a/Day 2.pptx
+++ b/Day 2.pptx
@@ -5,7 +5,7 @@
     <p:sldMasterId id="2147483648" r:id="rId1"/>
   </p:sldMasterIdLst>
   <p:notesMasterIdLst>
-    <p:notesMasterId r:id="rId35"/>
+    <p:notesMasterId r:id="rId43"/>
   </p:notesMasterIdLst>
   <p:sldIdLst>
     <p:sldId id="290" r:id="rId2"/>
@@ -28,19 +28,27 @@
     <p:sldId id="320" r:id="rId19"/>
     <p:sldId id="324" r:id="rId20"/>
     <p:sldId id="321" r:id="rId21"/>
-    <p:sldId id="348" r:id="rId22"/>
-    <p:sldId id="349" r:id="rId23"/>
+    <p:sldId id="349" r:id="rId22"/>
+    <p:sldId id="356" r:id="rId23"/>
     <p:sldId id="314" r:id="rId24"/>
     <p:sldId id="343" r:id="rId25"/>
     <p:sldId id="344" r:id="rId26"/>
     <p:sldId id="346" r:id="rId27"/>
-    <p:sldId id="328" r:id="rId28"/>
-    <p:sldId id="295" r:id="rId29"/>
-    <p:sldId id="296" r:id="rId30"/>
-    <p:sldId id="329" r:id="rId31"/>
-    <p:sldId id="330" r:id="rId32"/>
-    <p:sldId id="331" r:id="rId33"/>
-    <p:sldId id="332" r:id="rId34"/>
+    <p:sldId id="357" r:id="rId28"/>
+    <p:sldId id="328" r:id="rId29"/>
+    <p:sldId id="295" r:id="rId30"/>
+    <p:sldId id="296" r:id="rId31"/>
+    <p:sldId id="355" r:id="rId32"/>
+    <p:sldId id="358" r:id="rId33"/>
+    <p:sldId id="359" r:id="rId34"/>
+    <p:sldId id="350" r:id="rId35"/>
+    <p:sldId id="352" r:id="rId36"/>
+    <p:sldId id="331" r:id="rId37"/>
+    <p:sldId id="351" r:id="rId38"/>
+    <p:sldId id="362" r:id="rId39"/>
+    <p:sldId id="360" r:id="rId40"/>
+    <p:sldId id="361" r:id="rId41"/>
+    <p:sldId id="363" r:id="rId42"/>
   </p:sldIdLst>
   <p:sldSz cx="9144000" cy="6858000" type="screen4x3"/>
   <p:notesSz cx="6858000" cy="9144000"/>
@@ -240,7 +248,7 @@
           <a:p>
             <a:fld id="{909AFCF1-7F48-4D21-8D27-97E9804428B6}" type="datetimeFigureOut">
               <a:rPr lang="en-US" smtClean="0"/>
-              <a:t>8/9/2019</a:t>
+              <a:t>8/14/2019</a:t>
             </a:fld>
             <a:endParaRPr lang="en-US"/>
           </a:p>
@@ -689,7 +697,7 @@
           <a:p>
             <a:fld id="{A17B4B1F-9ADE-4FEE-88FC-832835B49A13}" type="datetime4">
               <a:rPr lang="en-US" smtClean="0"/>
-              <a:t>August 9, 2019</a:t>
+              <a:t>August 14, 2019</a:t>
             </a:fld>
             <a:endParaRPr lang="en-US" dirty="0"/>
           </a:p>
@@ -1087,7 +1095,7 @@
           <a:p>
             <a:fld id="{CAEF89AF-97FF-41FD-A810-843DAB910B39}" type="datetime4">
               <a:rPr lang="en-US" smtClean="0"/>
-              <a:t>August 9, 2019</a:t>
+              <a:t>August 14, 2019</a:t>
             </a:fld>
             <a:endParaRPr lang="en-US" dirty="0"/>
           </a:p>
@@ -1432,7 +1440,7 @@
           <a:p>
             <a:fld id="{58C37697-90A4-4007-8C23-BAAA588B27B3}" type="datetime4">
               <a:rPr lang="en-US" smtClean="0"/>
-              <a:t>August 9, 2019</a:t>
+              <a:t>August 14, 2019</a:t>
             </a:fld>
             <a:endParaRPr lang="en-US" dirty="0"/>
           </a:p>
@@ -1818,7 +1826,7 @@
           <a:p>
             <a:fld id="{C526132D-74A4-457B-9FB6-E79DB3FA6555}" type="datetime4">
               <a:rPr lang="en-US" smtClean="0"/>
-              <a:t>August 9, 2019</a:t>
+              <a:t>August 14, 2019</a:t>
             </a:fld>
             <a:endParaRPr lang="en-US" dirty="0"/>
           </a:p>
@@ -2161,7 +2169,7 @@
           <a:p>
             <a:fld id="{6A0291C7-F608-4246-89E2-5DBB54EDEF09}" type="datetime4">
               <a:rPr lang="en-US" smtClean="0"/>
-              <a:t>August 9, 2019</a:t>
+              <a:t>August 14, 2019</a:t>
             </a:fld>
             <a:endParaRPr lang="en-US" dirty="0"/>
           </a:p>
@@ -2339,7 +2347,7 @@
           <a:p>
             <a:fld id="{4D013C2E-F697-4ACF-9974-2B7ED63A336A}" type="datetime4">
               <a:rPr lang="en-US" smtClean="0"/>
-              <a:t>August 9, 2019</a:t>
+              <a:t>August 14, 2019</a:t>
             </a:fld>
             <a:endParaRPr lang="en-US" dirty="0"/>
           </a:p>
@@ -2584,7 +2592,7 @@
           <a:p>
             <a:fld id="{D4335327-653A-45BD-A8A4-D16B8D9BB63F}" type="datetime4">
               <a:rPr lang="en-US" smtClean="0"/>
-              <a:t>August 9, 2019</a:t>
+              <a:t>August 14, 2019</a:t>
             </a:fld>
             <a:endParaRPr lang="en-US" dirty="0"/>
           </a:p>
@@ -3267,7 +3275,7 @@
           <a:p>
             <a:fld id="{CAEF89AF-97FF-41FD-A810-843DAB910B39}" type="datetime4">
               <a:rPr lang="en-US" smtClean="0"/>
-              <a:t>August 12, 2019</a:t>
+              <a:t>August 14, 2019</a:t>
             </a:fld>
             <a:endParaRPr lang="en-US" dirty="0"/>
           </a:p>
@@ -3408,7 +3416,7 @@
           <a:p>
             <a:fld id="{CAEF89AF-97FF-41FD-A810-843DAB910B39}" type="datetime4">
               <a:rPr lang="en-US" smtClean="0"/>
-              <a:t>August 9, 2019</a:t>
+              <a:t>August 14, 2019</a:t>
             </a:fld>
             <a:endParaRPr lang="en-US" dirty="0"/>
           </a:p>
@@ -3604,7 +3612,7 @@
           <a:p>
             <a:fld id="{58C37697-90A4-4007-8C23-BAAA588B27B3}" type="datetime4">
               <a:rPr lang="en-US" smtClean="0"/>
-              <a:t>August 9, 2019</a:t>
+              <a:t>August 14, 2019</a:t>
             </a:fld>
             <a:endParaRPr lang="en-US" dirty="0"/>
           </a:p>
@@ -3741,7 +3749,7 @@
           <a:p>
             <a:fld id="{CAEF89AF-97FF-41FD-A810-843DAB910B39}" type="datetime4">
               <a:rPr lang="en-US" smtClean="0"/>
-              <a:t>August 12, 2019</a:t>
+              <a:t>August 14, 2019</a:t>
             </a:fld>
             <a:endParaRPr lang="en-US" dirty="0"/>
           </a:p>
@@ -4079,7 +4087,7 @@
           <a:p>
             <a:fld id="{CAEF89AF-97FF-41FD-A810-843DAB910B39}" type="datetime4">
               <a:rPr lang="en-US" smtClean="0"/>
-              <a:t>August 9, 2019</a:t>
+              <a:t>August 14, 2019</a:t>
             </a:fld>
             <a:endParaRPr lang="en-US" dirty="0"/>
           </a:p>
@@ -4262,7 +4270,7 @@
           <a:p>
             <a:fld id="{CAEF89AF-97FF-41FD-A810-843DAB910B39}" type="datetime4">
               <a:rPr lang="en-US" smtClean="0"/>
-              <a:t>August 9, 2019</a:t>
+              <a:t>August 14, 2019</a:t>
             </a:fld>
             <a:endParaRPr lang="en-US" dirty="0"/>
           </a:p>
@@ -4480,7 +4488,7 @@
           <a:p>
             <a:fld id="{CAEF89AF-97FF-41FD-A810-843DAB910B39}" type="datetime4">
               <a:rPr lang="en-US" smtClean="0"/>
-              <a:t>August 9, 2019</a:t>
+              <a:t>August 14, 2019</a:t>
             </a:fld>
             <a:endParaRPr lang="en-US" dirty="0"/>
           </a:p>
@@ -4727,7 +4735,6 @@
               <a:rPr lang="en-US" dirty="0"/>
               <a:t>B</a:t>
             </a:r>
-            <a:endParaRPr lang="en-US" dirty="0"/>
           </a:p>
         </p:txBody>
       </p:sp>
@@ -5329,7 +5336,7 @@
           <a:p>
             <a:fld id="{86768572-F13A-4AC8-B064-CDBF8DA91B73}" type="datetime4">
               <a:rPr lang="en-US" smtClean="0"/>
-              <a:t>August 9, 2019</a:t>
+              <a:t>August 14, 2019</a:t>
             </a:fld>
             <a:endParaRPr lang="en-US" dirty="0"/>
           </a:p>
@@ -5742,7 +5749,7 @@
           <a:p>
             <a:fld id="{58C37697-90A4-4007-8C23-BAAA588B27B3}" type="datetime4">
               <a:rPr lang="en-US" smtClean="0"/>
-              <a:t>August 9, 2019</a:t>
+              <a:t>August 14, 2019</a:t>
             </a:fld>
             <a:endParaRPr lang="en-US" dirty="0"/>
           </a:p>
@@ -6026,7 +6033,7 @@
           <a:p>
             <a:fld id="{CAEF89AF-97FF-41FD-A810-843DAB910B39}" type="datetime4">
               <a:rPr lang="en-US" smtClean="0"/>
-              <a:t>August 9, 2019</a:t>
+              <a:t>August 14, 2019</a:t>
             </a:fld>
             <a:endParaRPr lang="en-US" dirty="0"/>
           </a:p>
@@ -6361,11 +6368,7 @@
           <a:p>
             <a:r>
               <a:rPr lang="en-US" dirty="0" smtClean="0"/>
-              <a:t>Lunch Time To-Do </a:t>
-            </a:r>
-            <a:r>
-              <a:rPr lang="en-US" dirty="0" smtClean="0"/>
-              <a:t>List</a:t>
+              <a:t>Lunch Time To-Do List</a:t>
             </a:r>
             <a:endParaRPr lang="en-US" dirty="0"/>
           </a:p>
@@ -6410,7 +6413,6 @@
               <a:rPr lang="en-US" dirty="0" smtClean="0"/>
               <a:t>Connect to GitHub account. </a:t>
             </a:r>
-            <a:endParaRPr lang="en-US" dirty="0" smtClean="0"/>
           </a:p>
           <a:p>
             <a:pPr marL="0" indent="0">
@@ -6483,7 +6485,7 @@
           <a:p>
             <a:fld id="{58C37697-90A4-4007-8C23-BAAA588B27B3}" type="datetime4">
               <a:rPr lang="en-US" smtClean="0"/>
-              <a:t>August 9, 2019</a:t>
+              <a:t>August 14, 2019</a:t>
             </a:fld>
             <a:endParaRPr lang="en-US" dirty="0"/>
           </a:p>
@@ -6709,7 +6711,7 @@
           <a:p>
             <a:fld id="{CAEF89AF-97FF-41FD-A810-843DAB910B39}" type="datetime4">
               <a:rPr lang="en-US" smtClean="0"/>
-              <a:t>August 9, 2019</a:t>
+              <a:t>August 14, 2019</a:t>
             </a:fld>
             <a:endParaRPr lang="en-US" dirty="0"/>
           </a:p>
@@ -6745,9 +6747,48 @@
           <a:chExt cx="0" cy="0"/>
         </a:xfrm>
       </p:grpSpPr>
-      <p:sp>
-        <p:nvSpPr>
-          <p:cNvPr id="7" name="Title 6"/>
+      <p:pic>
+        <p:nvPicPr>
+          <p:cNvPr id="1028" name="Picture 4" descr="Image result for sticky note"/>
+          <p:cNvPicPr>
+            <a:picLocks noChangeAspect="1" noChangeArrowheads="1"/>
+          </p:cNvPicPr>
+          <p:nvPr/>
+        </p:nvPicPr>
+        <p:blipFill rotWithShape="1">
+          <a:blip r:embed="rId2">
+            <a:extLst>
+              <a:ext uri="{28A0092B-C50C-407E-A947-70E740481C1C}">
+                <a14:useLocalDpi xmlns:a14="http://schemas.microsoft.com/office/drawing/2010/main" val="0"/>
+              </a:ext>
+            </a:extLst>
+          </a:blip>
+          <a:srcRect r="7507"/>
+          <a:stretch/>
+        </p:blipFill>
+        <p:spPr bwMode="auto">
+          <a:xfrm rot="300000">
+            <a:off x="5530282" y="3289202"/>
+            <a:ext cx="4009566" cy="3018814"/>
+          </a:xfrm>
+          <a:prstGeom prst="rect">
+            <a:avLst/>
+          </a:prstGeom>
+          <a:noFill/>
+          <a:extLst>
+            <a:ext uri="{909E8E84-426E-40DD-AFC4-6F175D3DCCD1}">
+              <a14:hiddenFill xmlns:a14="http://schemas.microsoft.com/office/drawing/2010/main">
+                <a:solidFill>
+                  <a:srgbClr val="FFFFFF"/>
+                </a:solidFill>
+              </a14:hiddenFill>
+            </a:ext>
+          </a:extLst>
+        </p:spPr>
+      </p:pic>
+      <p:sp>
+        <p:nvSpPr>
+          <p:cNvPr id="2" name="Title 1"/>
           <p:cNvSpPr>
             <a:spLocks noGrp="1"/>
           </p:cNvSpPr>
@@ -6762,15 +6803,15 @@
           <a:p>
             <a:r>
               <a:rPr lang="en-US" dirty="0" smtClean="0"/>
-              <a:t>User Psychology on Wait Time</a:t>
-            </a:r>
-            <a:endParaRPr lang="en-US" dirty="0"/>
-          </a:p>
-        </p:txBody>
-      </p:sp>
-      <p:sp>
-        <p:nvSpPr>
-          <p:cNvPr id="8" name="Content Placeholder 7"/>
+              <a:t>When to load data? </a:t>
+            </a:r>
+            <a:endParaRPr lang="en-US" dirty="0"/>
+          </a:p>
+        </p:txBody>
+      </p:sp>
+      <p:sp>
+        <p:nvSpPr>
+          <p:cNvPr id="3" name="Content Placeholder 2"/>
           <p:cNvSpPr>
             <a:spLocks noGrp="1"/>
           </p:cNvSpPr>
@@ -6778,31 +6819,222 @@
             <p:ph idx="1"/>
           </p:nvPr>
         </p:nvSpPr>
-        <p:spPr/>
-        <p:txBody>
-          <a:bodyPr/>
-          <a:lstStyle/>
-          <a:p>
-            <a:r>
-              <a:rPr lang="en-US" dirty="0" smtClean="0"/>
-              <a:t>Users are generally more tolerant to waiting for the app to load at the start than waiting intermittently. </a:t>
-            </a:r>
-          </a:p>
-          <a:p>
-            <a:r>
-              <a:rPr lang="en-US" dirty="0" smtClean="0"/>
-              <a:t>Getting information on the wait time helps users manage their expectations. </a:t>
-            </a:r>
-          </a:p>
-          <a:p>
-            <a:pPr lvl="1"/>
-            <a:r>
-              <a:rPr lang="en-US" dirty="0" smtClean="0"/>
-              <a:t>Use progress Bars</a:t>
-            </a:r>
-          </a:p>
-          <a:p>
-            <a:endParaRPr lang="en-US" dirty="0"/>
+        <p:spPr>
+          <a:xfrm>
+            <a:off x="457200" y="1600200"/>
+            <a:ext cx="8229600" cy="4800600"/>
+          </a:xfrm>
+        </p:spPr>
+        <p:txBody>
+          <a:bodyPr>
+            <a:noAutofit/>
+          </a:bodyPr>
+          <a:lstStyle/>
+          <a:p>
+            <a:pPr marL="514350" indent="-514350">
+              <a:buFont typeface="+mj-lt"/>
+              <a:buAutoNum type="arabicPeriod"/>
+            </a:pPr>
+            <a:r>
+              <a:rPr lang="en-US" sz="1800" dirty="0" smtClean="0"/>
+              <a:t>In </a:t>
+            </a:r>
+            <a:r>
+              <a:rPr lang="en-US" sz="1800" dirty="0" err="1" smtClean="0"/>
+              <a:t>global.r</a:t>
+            </a:r>
+            <a:endParaRPr lang="en-US" sz="1800" dirty="0" smtClean="0"/>
+          </a:p>
+          <a:p>
+            <a:pPr lvl="1">
+              <a:buFont typeface="Arial" panose="020B0604020202020204" pitchFamily="34" charset="0"/>
+              <a:buChar char="•"/>
+            </a:pPr>
+            <a:r>
+              <a:rPr lang="en-US" sz="1400" dirty="0" smtClean="0"/>
+              <a:t>Loaded once for multiple “concurrent” users. </a:t>
+            </a:r>
+          </a:p>
+          <a:p>
+            <a:pPr lvl="2">
+              <a:buFont typeface="Wingdings" panose="05000000000000000000" pitchFamily="2" charset="2"/>
+              <a:buChar char="à"/>
+            </a:pPr>
+            <a:r>
+              <a:rPr lang="en-US" sz="1200" dirty="0" smtClean="0">
+                <a:sym typeface="Wingdings" panose="05000000000000000000" pitchFamily="2" charset="2"/>
+              </a:rPr>
+              <a:t>Different load times per session, but reloading an app is generally super fast. </a:t>
+            </a:r>
+          </a:p>
+          <a:p>
+            <a:pPr lvl="2">
+              <a:buFont typeface="Wingdings" panose="05000000000000000000" pitchFamily="2" charset="2"/>
+              <a:buChar char="à"/>
+            </a:pPr>
+            <a:r>
+              <a:rPr lang="en-US" sz="1200" dirty="0" smtClean="0">
+                <a:sym typeface="Wingdings" panose="05000000000000000000" pitchFamily="2" charset="2"/>
+              </a:rPr>
+              <a:t> When </a:t>
+            </a:r>
+            <a:r>
+              <a:rPr lang="en-US" sz="1200" dirty="0" err="1" smtClean="0">
+                <a:sym typeface="Wingdings" panose="05000000000000000000" pitchFamily="2" charset="2"/>
+              </a:rPr>
+              <a:t>global.r</a:t>
+            </a:r>
+            <a:r>
+              <a:rPr lang="en-US" sz="1200" dirty="0" smtClean="0">
+                <a:sym typeface="Wingdings" panose="05000000000000000000" pitchFamily="2" charset="2"/>
+              </a:rPr>
+              <a:t> needs to be re-run, opening the app (before anything appears) may take a while. </a:t>
+            </a:r>
+          </a:p>
+          <a:p>
+            <a:pPr lvl="2">
+              <a:buFont typeface="Wingdings" panose="05000000000000000000" pitchFamily="2" charset="2"/>
+              <a:buChar char="à"/>
+            </a:pPr>
+            <a:endParaRPr lang="en-US" sz="1200" dirty="0" smtClean="0"/>
+          </a:p>
+          <a:p>
+            <a:pPr marL="514350" indent="-514350">
+              <a:buFont typeface="+mj-lt"/>
+              <a:buAutoNum type="arabicPeriod"/>
+            </a:pPr>
+            <a:r>
+              <a:rPr lang="en-US" sz="1800" dirty="0" smtClean="0"/>
+              <a:t>Within server</a:t>
+            </a:r>
+          </a:p>
+          <a:p>
+            <a:pPr lvl="1">
+              <a:buFont typeface="Arial" panose="020B0604020202020204" pitchFamily="34" charset="0"/>
+              <a:buChar char="•"/>
+            </a:pPr>
+            <a:r>
+              <a:rPr lang="en-US" sz="1400" dirty="0" smtClean="0"/>
+              <a:t>Loaded once every time a session is opened. </a:t>
+            </a:r>
+          </a:p>
+          <a:p>
+            <a:pPr lvl="2">
+              <a:buFont typeface="Wingdings" panose="05000000000000000000" pitchFamily="2" charset="2"/>
+              <a:buChar char="à"/>
+            </a:pPr>
+            <a:r>
+              <a:rPr lang="en-US" sz="1200" dirty="0" smtClean="0">
+                <a:sym typeface="Wingdings" panose="05000000000000000000" pitchFamily="2" charset="2"/>
+              </a:rPr>
+              <a:t>Same load time for everyone every time. </a:t>
+            </a:r>
+          </a:p>
+          <a:p>
+            <a:pPr lvl="2">
+              <a:buFont typeface="Wingdings" panose="05000000000000000000" pitchFamily="2" charset="2"/>
+              <a:buChar char="à"/>
+            </a:pPr>
+            <a:r>
+              <a:rPr lang="en-US" sz="1200" dirty="0" smtClean="0">
+                <a:sym typeface="Wingdings" panose="05000000000000000000" pitchFamily="2" charset="2"/>
+              </a:rPr>
+              <a:t>Loading will happen at the beginning of the app, but UI will show up. </a:t>
+            </a:r>
+          </a:p>
+          <a:p>
+            <a:pPr lvl="2">
+              <a:buFont typeface="Wingdings" panose="05000000000000000000" pitchFamily="2" charset="2"/>
+              <a:buChar char="à"/>
+            </a:pPr>
+            <a:endParaRPr lang="en-US" sz="1200" dirty="0" smtClean="0"/>
+          </a:p>
+          <a:p>
+            <a:pPr marL="514350" indent="-514350">
+              <a:buFont typeface="+mj-lt"/>
+              <a:buAutoNum type="arabicPeriod"/>
+            </a:pPr>
+            <a:r>
+              <a:rPr lang="en-US" sz="1800" dirty="0" smtClean="0"/>
+              <a:t>Within reactive</a:t>
+            </a:r>
+          </a:p>
+          <a:p>
+            <a:pPr marL="914400" lvl="1" indent="-514350">
+              <a:buFont typeface="Arial" panose="020B0604020202020204" pitchFamily="34" charset="0"/>
+              <a:buChar char="•"/>
+            </a:pPr>
+            <a:r>
+              <a:rPr lang="en-US" sz="1400" dirty="0" smtClean="0"/>
+              <a:t>Loaded when needed. </a:t>
+            </a:r>
+          </a:p>
+          <a:p>
+            <a:pPr marL="914400" lvl="1" indent="-514350">
+              <a:buFont typeface="Arial" panose="020B0604020202020204" pitchFamily="34" charset="0"/>
+              <a:buChar char="•"/>
+            </a:pPr>
+            <a:r>
+              <a:rPr lang="en-US" sz="1400" dirty="0" smtClean="0"/>
+              <a:t>Loaded when the reactive object needs an update. </a:t>
+            </a:r>
+          </a:p>
+          <a:p>
+            <a:pPr marL="1257300" lvl="2" indent="-457200">
+              <a:buFont typeface="Wingdings" panose="05000000000000000000" pitchFamily="2" charset="2"/>
+              <a:buChar char="à"/>
+            </a:pPr>
+            <a:r>
+              <a:rPr lang="en-US" sz="1200" dirty="0" smtClean="0">
+                <a:sym typeface="Wingdings" panose="05000000000000000000" pitchFamily="2" charset="2"/>
+              </a:rPr>
+              <a:t>A good option if data is needed only for a particular optional section of the UI.</a:t>
+            </a:r>
+          </a:p>
+          <a:p>
+            <a:pPr marL="1257300" lvl="2" indent="-457200">
+              <a:buFont typeface="Wingdings" panose="05000000000000000000" pitchFamily="2" charset="2"/>
+              <a:buChar char="à"/>
+            </a:pPr>
+            <a:endParaRPr lang="en-US" sz="1200" dirty="0" smtClean="0"/>
+          </a:p>
+          <a:p>
+            <a:pPr marL="514350" indent="-514350">
+              <a:buFont typeface="+mj-lt"/>
+              <a:buAutoNum type="arabicPeriod"/>
+            </a:pPr>
+            <a:r>
+              <a:rPr lang="en-US" sz="1800" dirty="0" smtClean="0"/>
+              <a:t>Using </a:t>
+            </a:r>
+            <a:r>
+              <a:rPr lang="en-US" sz="1800" dirty="0" err="1" smtClean="0"/>
+              <a:t>reactiveValues</a:t>
+            </a:r>
+            <a:endParaRPr lang="en-US" sz="1800" dirty="0" smtClean="0"/>
+          </a:p>
+          <a:p>
+            <a:pPr marL="914400" lvl="1" indent="-514350">
+              <a:buFont typeface="Arial" panose="020B0604020202020204" pitchFamily="34" charset="0"/>
+              <a:buChar char="•"/>
+            </a:pPr>
+            <a:r>
+              <a:rPr lang="en-US" sz="1400" dirty="0" smtClean="0"/>
+              <a:t>You decide when it’s loaded. </a:t>
+            </a:r>
+          </a:p>
+          <a:p>
+            <a:pPr marL="1257300" lvl="2" indent="-457200">
+              <a:buFont typeface="Wingdings" panose="05000000000000000000" pitchFamily="2" charset="2"/>
+              <a:buChar char="à"/>
+            </a:pPr>
+            <a:r>
+              <a:rPr lang="en-US" sz="1200" dirty="0" smtClean="0">
+                <a:sym typeface="Wingdings" panose="05000000000000000000" pitchFamily="2" charset="2"/>
+              </a:rPr>
+              <a:t>Useful for partial load + appending. </a:t>
+            </a:r>
+            <a:endParaRPr lang="en-US" sz="1200" dirty="0" smtClean="0"/>
           </a:p>
         </p:txBody>
       </p:sp>
@@ -6867,18 +7099,72 @@
           <a:bodyPr/>
           <a:lstStyle/>
           <a:p>
-            <a:fld id="{58C37697-90A4-4007-8C23-BAAA588B27B3}" type="datetime4">
-              <a:rPr lang="en-US" smtClean="0"/>
-              <a:t>August 13, 2019</a:t>
+            <a:fld id="{CAEF89AF-97FF-41FD-A810-843DAB910B39}" type="datetime4">
+              <a:rPr lang="en-US" smtClean="0"/>
+              <a:t>August 14, 2019</a:t>
             </a:fld>
             <a:endParaRPr lang="en-US" dirty="0"/>
+          </a:p>
+        </p:txBody>
+      </p:sp>
+      <p:sp>
+        <p:nvSpPr>
+          <p:cNvPr id="7" name="TextBox 6"/>
+          <p:cNvSpPr txBox="1"/>
+          <p:nvPr/>
+        </p:nvSpPr>
+        <p:spPr>
+          <a:xfrm>
+            <a:off x="6629401" y="4038600"/>
+            <a:ext cx="2057400" cy="1600438"/>
+          </a:xfrm>
+          <a:prstGeom prst="rect">
+            <a:avLst/>
+          </a:prstGeom>
+          <a:noFill/>
+        </p:spPr>
+        <p:txBody>
+          <a:bodyPr wrap="square" rtlCol="0">
+            <a:spAutoFit/>
+          </a:bodyPr>
+          <a:lstStyle/>
+          <a:p>
+            <a:pPr marL="285750" indent="-285750">
+              <a:buFont typeface="Arial" panose="020B0604020202020204" pitchFamily="34" charset="0"/>
+              <a:buChar char="•"/>
+            </a:pPr>
+            <a:r>
+              <a:rPr lang="en-US" sz="1400" dirty="0" smtClean="0"/>
+              <a:t>Users likes to know if it’s loading or broken.</a:t>
+            </a:r>
+          </a:p>
+          <a:p>
+            <a:pPr marL="285750" indent="-285750">
+              <a:buFont typeface="Arial" panose="020B0604020202020204" pitchFamily="34" charset="0"/>
+              <a:buChar char="•"/>
+            </a:pPr>
+            <a:r>
+              <a:rPr lang="en-US" sz="1400" dirty="0" smtClean="0"/>
+              <a:t>Users like expected behaviors. </a:t>
+            </a:r>
+          </a:p>
+          <a:p>
+            <a:pPr marL="285750" indent="-285750">
+              <a:buFont typeface="Arial" panose="020B0604020202020204" pitchFamily="34" charset="0"/>
+              <a:buChar char="•"/>
+            </a:pPr>
+            <a:r>
+              <a:rPr lang="en-US" sz="1400" dirty="0" smtClean="0"/>
+              <a:t>Users prefer initial load wait then intermittent pauses.  </a:t>
+            </a:r>
+            <a:endParaRPr lang="en-US" sz="1400" dirty="0"/>
           </a:p>
         </p:txBody>
       </p:sp>
     </p:spTree>
     <p:extLst>
       <p:ext uri="{BB962C8B-B14F-4D97-AF65-F5344CB8AC3E}">
-        <p14:creationId xmlns:p14="http://schemas.microsoft.com/office/powerpoint/2010/main" val="444040802"/>
+        <p14:creationId xmlns:p14="http://schemas.microsoft.com/office/powerpoint/2010/main" val="1298567385"/>
       </p:ext>
     </p:extLst>
   </p:cSld>
@@ -6922,7 +7208,7 @@
           <a:p>
             <a:r>
               <a:rPr lang="en-US" dirty="0" smtClean="0"/>
-              <a:t>When to load data? </a:t>
+              <a:t>Controlling global data load</a:t>
             </a:r>
             <a:endParaRPr lang="en-US" dirty="0"/>
           </a:p>
@@ -6940,10 +7226,66 @@
         </p:nvSpPr>
         <p:spPr/>
         <p:txBody>
-          <a:bodyPr/>
-          <a:lstStyle/>
-          <a:p>
-            <a:endParaRPr lang="en-US" dirty="0"/>
+          <a:bodyPr>
+            <a:normAutofit/>
+          </a:bodyPr>
+          <a:lstStyle/>
+          <a:p>
+            <a:r>
+              <a:rPr lang="en-US" sz="2800" dirty="0" smtClean="0"/>
+              <a:t>Shiny server decide to rerun </a:t>
+            </a:r>
+            <a:r>
+              <a:rPr lang="en-US" sz="2800" dirty="0" err="1" smtClean="0"/>
+              <a:t>global.r</a:t>
+            </a:r>
+            <a:r>
+              <a:rPr lang="en-US" sz="2800" dirty="0" smtClean="0"/>
+              <a:t> when: </a:t>
+            </a:r>
+          </a:p>
+          <a:p>
+            <a:pPr lvl="1"/>
+            <a:r>
+              <a:rPr lang="en-US" sz="2400" dirty="0" smtClean="0"/>
+              <a:t>Server is rebooted. </a:t>
+            </a:r>
+          </a:p>
+          <a:p>
+            <a:pPr lvl="1"/>
+            <a:r>
+              <a:rPr lang="en-US" sz="2400" dirty="0" smtClean="0"/>
+              <a:t>Server detects changes in app files. </a:t>
+            </a:r>
+          </a:p>
+          <a:p>
+            <a:pPr lvl="1"/>
+            <a:r>
+              <a:rPr lang="en-US" sz="2400" dirty="0" smtClean="0"/>
+              <a:t>And who knows when else. </a:t>
+            </a:r>
+          </a:p>
+          <a:p>
+            <a:pPr lvl="1"/>
+            <a:endParaRPr lang="en-US" sz="2400" dirty="0" smtClean="0"/>
+          </a:p>
+          <a:p>
+            <a:r>
+              <a:rPr lang="en-US" sz="2800" dirty="0" smtClean="0"/>
+              <a:t>When a new data is available, it may not necessarily know to rerun global. </a:t>
+            </a:r>
+          </a:p>
+          <a:p>
+            <a:pPr marL="457200" lvl="1" indent="0">
+              <a:buNone/>
+            </a:pPr>
+            <a:r>
+              <a:rPr lang="en-US" sz="2400" dirty="0" smtClean="0">
+                <a:sym typeface="Wingdings" panose="05000000000000000000" pitchFamily="2" charset="2"/>
+              </a:rPr>
+              <a:t> </a:t>
+            </a:r>
+            <a:endParaRPr lang="en-US" sz="2400" dirty="0"/>
           </a:p>
         </p:txBody>
       </p:sp>
@@ -7010,16 +7352,40 @@
           <a:p>
             <a:fld id="{CAEF89AF-97FF-41FD-A810-843DAB910B39}" type="datetime4">
               <a:rPr lang="en-US" smtClean="0"/>
-              <a:t>August 13, 2019</a:t>
+              <a:t>August 14, 2019</a:t>
             </a:fld>
             <a:endParaRPr lang="en-US" dirty="0"/>
           </a:p>
         </p:txBody>
       </p:sp>
+      <p:pic>
+        <p:nvPicPr>
+          <p:cNvPr id="7" name="Picture 6"/>
+          <p:cNvPicPr>
+            <a:picLocks noChangeAspect="1"/>
+          </p:cNvPicPr>
+          <p:nvPr/>
+        </p:nvPicPr>
+        <p:blipFill>
+          <a:blip r:embed="rId2"/>
+          <a:stretch>
+            <a:fillRect/>
+          </a:stretch>
+        </p:blipFill>
+        <p:spPr>
+          <a:xfrm>
+            <a:off x="1312937" y="4876800"/>
+            <a:ext cx="7397416" cy="533400"/>
+          </a:xfrm>
+          <a:prstGeom prst="rect">
+            <a:avLst/>
+          </a:prstGeom>
+        </p:spPr>
+      </p:pic>
     </p:spTree>
     <p:extLst>
       <p:ext uri="{BB962C8B-B14F-4D97-AF65-F5344CB8AC3E}">
-        <p14:creationId xmlns:p14="http://schemas.microsoft.com/office/powerpoint/2010/main" val="1298567385"/>
+        <p14:creationId xmlns:p14="http://schemas.microsoft.com/office/powerpoint/2010/main" val="2993930985"/>
       </p:ext>
     </p:extLst>
   </p:cSld>
@@ -7155,7 +7521,7 @@
           <a:p>
             <a:fld id="{CAEF89AF-97FF-41FD-A810-843DAB910B39}" type="datetime4">
               <a:rPr lang="en-US" smtClean="0"/>
-              <a:t>August 9, 2019</a:t>
+              <a:t>August 14, 2019</a:t>
             </a:fld>
             <a:endParaRPr lang="en-US" dirty="0"/>
           </a:p>
@@ -7328,7 +7694,6 @@
               <a:rPr lang="en-US" dirty="0" smtClean="0"/>
               <a:t>.</a:t>
             </a:r>
-            <a:endParaRPr lang="en-US" dirty="0" smtClean="0"/>
           </a:p>
           <a:p>
             <a:pPr lvl="1"/>
@@ -7352,7 +7717,6 @@
               <a:rPr lang="en-US" dirty="0" smtClean="0"/>
               <a:t>We have a private account that is not open to public. </a:t>
             </a:r>
-            <a:endParaRPr lang="en-US" dirty="0" smtClean="0"/>
           </a:p>
           <a:p>
             <a:pPr lvl="1"/>
@@ -7428,53 +7792,113 @@
           <a:bodyPr/>
           <a:lstStyle/>
           <a:p>
-            <a:r>
-              <a:rPr lang="en-US" dirty="0" smtClean="0"/>
-              <a:t>Create </a:t>
-            </a:r>
-            <a:r>
-              <a:rPr lang="en-US" dirty="0" smtClean="0"/>
-              <a:t>a new </a:t>
-            </a:r>
-            <a:r>
-              <a:rPr lang="en-US" dirty="0" smtClean="0"/>
-              <a:t>repo. </a:t>
+            <a:pPr marL="514350" indent="-514350">
+              <a:buFont typeface="+mj-lt"/>
+              <a:buAutoNum type="arabicPeriod"/>
+            </a:pPr>
+            <a:r>
+              <a:rPr lang="en-US" dirty="0"/>
+              <a:t>Create a new </a:t>
+            </a:r>
+            <a:r>
+              <a:rPr lang="en-US" dirty="0" smtClean="0"/>
+              <a:t>branch in </a:t>
+            </a:r>
+            <a:r>
+              <a:rPr lang="en-US" dirty="0" err="1" smtClean="0"/>
+              <a:t>ShinyWorkshop</a:t>
+            </a:r>
+            <a:r>
+              <a:rPr lang="en-US" dirty="0" smtClean="0"/>
+              <a:t> repo. </a:t>
             </a:r>
             <a:endParaRPr lang="en-US" dirty="0" smtClean="0"/>
           </a:p>
           <a:p>
-            <a:r>
-              <a:rPr lang="en-US" dirty="0" smtClean="0"/>
-              <a:t>Pull to the local machine. </a:t>
+            <a:pPr marL="514350" indent="-514350">
+              <a:buFont typeface="+mj-lt"/>
+              <a:buAutoNum type="arabicPeriod"/>
+            </a:pPr>
+            <a:r>
+              <a:rPr lang="en-US" dirty="0" smtClean="0"/>
+              <a:t>Pull </a:t>
+            </a:r>
+            <a:r>
+              <a:rPr lang="en-US" dirty="0" smtClean="0"/>
+              <a:t>this</a:t>
+            </a:r>
+            <a:r>
+              <a:rPr lang="en-US" dirty="0" smtClean="0"/>
+              <a:t> repo to your </a:t>
+            </a:r>
+            <a:r>
+              <a:rPr lang="en-US" dirty="0" smtClean="0"/>
+              <a:t>local machine. </a:t>
             </a:r>
             <a:endParaRPr lang="en-US" dirty="0" smtClean="0"/>
           </a:p>
           <a:p>
-            <a:r>
-              <a:rPr lang="en-US" dirty="0" smtClean="0"/>
-              <a:t>Create a new branch. </a:t>
+            <a:pPr marL="514350" indent="-514350">
+              <a:buFont typeface="+mj-lt"/>
+              <a:buAutoNum type="arabicPeriod"/>
+            </a:pPr>
+            <a:r>
+              <a:rPr lang="en-US" dirty="0" smtClean="0"/>
+              <a:t>Activate your branch. </a:t>
             </a:r>
             <a:endParaRPr lang="en-US" dirty="0" smtClean="0"/>
           </a:p>
           <a:p>
-            <a:r>
-              <a:rPr lang="en-US" dirty="0" smtClean="0"/>
-              <a:t>Edit, save, stage, commit &amp; push.</a:t>
-            </a:r>
-          </a:p>
-          <a:p>
-            <a:pPr lvl="1"/>
-            <a:r>
-              <a:rPr lang="en-US" dirty="0" smtClean="0"/>
-              <a:t>Make sure to mention the issue number. </a:t>
-            </a:r>
-          </a:p>
-          <a:p>
+            <a:pPr marL="514350" indent="-514350">
+              <a:buFont typeface="+mj-lt"/>
+              <a:buAutoNum type="arabicPeriod"/>
+            </a:pPr>
+            <a:r>
+              <a:rPr lang="en-US" dirty="0" smtClean="0"/>
+              <a:t>Edit</a:t>
+            </a:r>
+            <a:r>
+              <a:rPr lang="en-US" dirty="0" smtClean="0"/>
+              <a:t>, save, stage, </a:t>
+            </a:r>
+            <a:r>
+              <a:rPr lang="en-US" dirty="0" smtClean="0"/>
+              <a:t>commit.</a:t>
+            </a:r>
+            <a:r>
+              <a:rPr lang="en-US" dirty="0"/>
+              <a:t> </a:t>
+            </a:r>
+            <a:r>
+              <a:rPr lang="en-US" dirty="0" smtClean="0"/>
+              <a:t>Make </a:t>
+            </a:r>
+            <a:r>
+              <a:rPr lang="en-US" dirty="0" smtClean="0"/>
+              <a:t>sure to mention the issue number. </a:t>
+            </a:r>
+            <a:endParaRPr lang="en-US" dirty="0" smtClean="0"/>
+          </a:p>
+          <a:p>
+            <a:pPr marL="514350" indent="-514350">
+              <a:buFont typeface="+mj-lt"/>
+              <a:buAutoNum type="arabicPeriod"/>
+            </a:pPr>
+            <a:r>
+              <a:rPr lang="en-US" dirty="0" smtClean="0"/>
+              <a:t>Push to remote repo. </a:t>
+            </a:r>
+            <a:endParaRPr lang="en-US" dirty="0" smtClean="0"/>
+          </a:p>
+          <a:p>
+            <a:pPr marL="514350" indent="-514350">
+              <a:buFont typeface="+mj-lt"/>
+              <a:buAutoNum type="arabicPeriod"/>
+            </a:pPr>
             <a:r>
               <a:rPr lang="en-US" dirty="0" smtClean="0"/>
               <a:t>Add comments on the issue page. </a:t>
             </a:r>
-            <a:endParaRPr lang="en-US" dirty="0" smtClean="0"/>
           </a:p>
           <a:p>
             <a:endParaRPr lang="en-US" dirty="0"/>
@@ -7713,7 +8137,7 @@
       </p:grpSpPr>
       <p:sp>
         <p:nvSpPr>
-          <p:cNvPr id="7" name="Title 6"/>
+          <p:cNvPr id="2" name="Title 1"/>
           <p:cNvSpPr>
             <a:spLocks noGrp="1"/>
           </p:cNvSpPr>
@@ -7728,15 +8152,15 @@
           <a:p>
             <a:r>
               <a:rPr lang="en-US" dirty="0" smtClean="0"/>
-              <a:t>Referencing Issue Number</a:t>
-            </a:r>
-            <a:endParaRPr lang="en-US" dirty="0"/>
-          </a:p>
-        </p:txBody>
-      </p:sp>
-      <p:sp>
-        <p:nvSpPr>
-          <p:cNvPr id="13" name="Content Placeholder 12"/>
+              <a:t>Demo</a:t>
+            </a:r>
+            <a:endParaRPr lang="en-US" dirty="0"/>
+          </a:p>
+        </p:txBody>
+      </p:sp>
+      <p:sp>
+        <p:nvSpPr>
+          <p:cNvPr id="3" name="Content Placeholder 2"/>
           <p:cNvSpPr>
             <a:spLocks noGrp="1"/>
           </p:cNvSpPr>
@@ -7750,25 +8174,9 @@
           <a:lstStyle/>
           <a:p>
             <a:r>
-              <a:rPr lang="en-US" dirty="0"/>
-              <a:t>Any commits that references the issue number will automatically appear in the issue page so that it’s very easy to find commits that are related to particular issues. </a:t>
-            </a:r>
-            <a:endParaRPr lang="en-US" dirty="0" smtClean="0"/>
-          </a:p>
-          <a:p>
-            <a:r>
-              <a:rPr lang="en-US" dirty="0" smtClean="0"/>
-              <a:t>Or </a:t>
-            </a:r>
-            <a:r>
-              <a:rPr lang="en-US" dirty="0"/>
-              <a:t>vice versa, if you are looking at a history of commits, and want to know details, you can go to the actual code changes, or the issue page to find out more. </a:t>
-            </a:r>
-          </a:p>
-          <a:p>
-            <a:endParaRPr lang="en-US" dirty="0"/>
-          </a:p>
-          <a:p>
+              <a:rPr lang="en-US" dirty="0" smtClean="0"/>
+              <a:t>Merge.</a:t>
+            </a:r>
             <a:endParaRPr lang="en-US" dirty="0"/>
           </a:p>
         </p:txBody>
@@ -7834,9 +8242,9 @@
           <a:bodyPr/>
           <a:lstStyle/>
           <a:p>
-            <a:fld id="{58C37697-90A4-4007-8C23-BAAA588B27B3}" type="datetime4">
-              <a:rPr lang="en-US" smtClean="0"/>
-              <a:t>August 9, 2019</a:t>
+            <a:fld id="{CAEF89AF-97FF-41FD-A810-843DAB910B39}" type="datetime4">
+              <a:rPr lang="en-US" smtClean="0"/>
+              <a:t>August 14, 2019</a:t>
             </a:fld>
             <a:endParaRPr lang="en-US" dirty="0"/>
           </a:p>
@@ -7845,7 +8253,7 @@
     </p:spTree>
     <p:extLst>
       <p:ext uri="{BB962C8B-B14F-4D97-AF65-F5344CB8AC3E}">
-        <p14:creationId xmlns:p14="http://schemas.microsoft.com/office/powerpoint/2010/main" val="1530425326"/>
+        <p14:creationId xmlns:p14="http://schemas.microsoft.com/office/powerpoint/2010/main" val="461115839"/>
       </p:ext>
     </p:extLst>
   </p:cSld>
@@ -7888,41 +8296,60 @@
           <a:lstStyle/>
           <a:p>
             <a:r>
-              <a:rPr lang="en-US" dirty="0">
-                <a:hlinkClick r:id="rId2"/>
-              </a:rPr>
-              <a:t>https://resources.rstudio.com/shiny-developer-conference/shinydevcon-debugging-jonathanmcpherson-1080p</a:t>
-            </a:r>
-            <a:endParaRPr lang="en-US" dirty="0"/>
-          </a:p>
-        </p:txBody>
-      </p:sp>
-      <p:sp>
-        <p:nvSpPr>
-          <p:cNvPr id="9" name="Text Placeholder 8"/>
-          <p:cNvSpPr>
-            <a:spLocks noGrp="1"/>
-          </p:cNvSpPr>
-          <p:nvPr>
-            <p:ph type="body" idx="1"/>
-          </p:nvPr>
-        </p:nvSpPr>
-        <p:spPr/>
-        <p:txBody>
-          <a:bodyPr/>
-          <a:lstStyle/>
-          <a:p>
-            <a:r>
-              <a:rPr lang="en-US" dirty="0" smtClean="0"/>
-              <a:t>Debugging</a:t>
-            </a:r>
-            <a:endParaRPr lang="en-US" dirty="0"/>
-          </a:p>
-        </p:txBody>
-      </p:sp>
-      <p:sp>
-        <p:nvSpPr>
-          <p:cNvPr id="5" name="Slide Number Placeholder 4"/>
+              <a:rPr lang="en-US" dirty="0" smtClean="0"/>
+              <a:t>Referencing Issue Number</a:t>
+            </a:r>
+            <a:endParaRPr lang="en-US" dirty="0"/>
+          </a:p>
+        </p:txBody>
+      </p:sp>
+      <p:sp>
+        <p:nvSpPr>
+          <p:cNvPr id="13" name="Content Placeholder 12"/>
+          <p:cNvSpPr>
+            <a:spLocks noGrp="1"/>
+          </p:cNvSpPr>
+          <p:nvPr>
+            <p:ph idx="1"/>
+          </p:nvPr>
+        </p:nvSpPr>
+        <p:spPr/>
+        <p:txBody>
+          <a:bodyPr>
+            <a:normAutofit lnSpcReduction="10000"/>
+          </a:bodyPr>
+          <a:lstStyle/>
+          <a:p>
+            <a:r>
+              <a:rPr lang="en-US" dirty="0"/>
+              <a:t>Any commits that references the issue number will automatically appear in the issue page so that it’s very easy to find commits that are related to particular issues. </a:t>
+            </a:r>
+            <a:endParaRPr lang="en-US" dirty="0" smtClean="0"/>
+          </a:p>
+          <a:p>
+            <a:endParaRPr lang="en-US" dirty="0" smtClean="0"/>
+          </a:p>
+          <a:p>
+            <a:r>
+              <a:rPr lang="en-US" dirty="0" smtClean="0"/>
+              <a:t>Or </a:t>
+            </a:r>
+            <a:r>
+              <a:rPr lang="en-US" dirty="0"/>
+              <a:t>vice versa, if you are looking at a history of commits, and want to know details, you can go to the actual code changes, or the issue page to find out more. </a:t>
+            </a:r>
+          </a:p>
+          <a:p>
+            <a:endParaRPr lang="en-US" dirty="0"/>
+          </a:p>
+          <a:p>
+            <a:endParaRPr lang="en-US" dirty="0"/>
+          </a:p>
+        </p:txBody>
+      </p:sp>
+      <p:sp>
+        <p:nvSpPr>
+          <p:cNvPr id="4" name="Slide Number Placeholder 3"/>
           <p:cNvSpPr>
             <a:spLocks noGrp="1"/>
           </p:cNvSpPr>
@@ -7945,7 +8372,7 @@
       </p:sp>
       <p:sp>
         <p:nvSpPr>
-          <p:cNvPr id="6" name="Footer Placeholder 5"/>
+          <p:cNvPr id="5" name="Footer Placeholder 4"/>
           <p:cNvSpPr>
             <a:spLocks noGrp="1"/>
           </p:cNvSpPr>
@@ -7968,7 +8395,7 @@
       </p:sp>
       <p:sp>
         <p:nvSpPr>
-          <p:cNvPr id="8" name="Date Placeholder 7"/>
+          <p:cNvPr id="6" name="Date Placeholder 5"/>
           <p:cNvSpPr>
             <a:spLocks noGrp="1"/>
           </p:cNvSpPr>
@@ -7981,9 +8408,9 @@
           <a:bodyPr/>
           <a:lstStyle/>
           <a:p>
-            <a:fld id="{2AE9CD06-5419-4F67-A0F0-D9130AC4F9A9}" type="datetime4">
-              <a:rPr lang="en-US" smtClean="0"/>
-              <a:t>August 9, 2019</a:t>
+            <a:fld id="{58C37697-90A4-4007-8C23-BAAA588B27B3}" type="datetime4">
+              <a:rPr lang="en-US" smtClean="0"/>
+              <a:t>August 14, 2019</a:t>
             </a:fld>
             <a:endParaRPr lang="en-US" dirty="0"/>
           </a:p>
@@ -7992,20 +8419,13 @@
     </p:spTree>
     <p:extLst>
       <p:ext uri="{BB962C8B-B14F-4D97-AF65-F5344CB8AC3E}">
-        <p14:creationId xmlns:p14="http://schemas.microsoft.com/office/powerpoint/2010/main" val="243809950"/>
+        <p14:creationId xmlns:p14="http://schemas.microsoft.com/office/powerpoint/2010/main" val="1530425326"/>
       </p:ext>
     </p:extLst>
   </p:cSld>
   <p:clrMapOvr>
     <a:masterClrMapping/>
   </p:clrMapOvr>
-  <p:timing>
-    <p:tnLst>
-      <p:par>
-        <p:cTn id="1" dur="indefinite" restart="never" nodeType="tmRoot"/>
-      </p:par>
-    </p:tnLst>
-  </p:timing>
 </p:sld>
 </file>
 
@@ -8041,63 +8461,36 @@
           <a:bodyPr/>
           <a:lstStyle/>
           <a:p>
-            <a:endParaRPr lang="en-US"/>
-          </a:p>
-        </p:txBody>
-      </p:sp>
-      <p:sp>
-        <p:nvSpPr>
-          <p:cNvPr id="8" name="Content Placeholder 7"/>
-          <p:cNvSpPr>
-            <a:spLocks noGrp="1"/>
-          </p:cNvSpPr>
-          <p:nvPr>
-            <p:ph idx="1"/>
-          </p:nvPr>
-        </p:nvSpPr>
-        <p:spPr/>
-        <p:txBody>
-          <a:bodyPr/>
-          <a:lstStyle/>
-          <a:p>
-            <a:r>
-              <a:rPr lang="en-US" dirty="0" err="1" smtClean="0"/>
-              <a:t>Brekpoints</a:t>
-            </a:r>
-            <a:r>
-              <a:rPr lang="en-US" dirty="0" smtClean="0"/>
-              <a:t> works only within server. </a:t>
-            </a:r>
-          </a:p>
-          <a:p>
-            <a:r>
-              <a:rPr lang="en-US" dirty="0" smtClean="0"/>
-              <a:t>Browser()</a:t>
-            </a:r>
-          </a:p>
-          <a:p>
-            <a:pPr lvl="1"/>
-            <a:r>
-              <a:rPr lang="en-US" dirty="0" smtClean="0"/>
-              <a:t>conditional </a:t>
-            </a:r>
-          </a:p>
-          <a:p>
-            <a:pPr lvl="1"/>
-            <a:endParaRPr lang="en-US" dirty="0"/>
-          </a:p>
-          <a:p>
-            <a:r>
-              <a:rPr lang="en-US" dirty="0" err="1" smtClean="0"/>
-              <a:t>Profvis</a:t>
-            </a:r>
-            <a:endParaRPr lang="en-US" dirty="0" smtClean="0"/>
-          </a:p>
-        </p:txBody>
-      </p:sp>
-      <p:sp>
-        <p:nvSpPr>
-          <p:cNvPr id="4" name="Slide Number Placeholder 3"/>
+            <a:endParaRPr lang="en-US" dirty="0"/>
+          </a:p>
+        </p:txBody>
+      </p:sp>
+      <p:sp>
+        <p:nvSpPr>
+          <p:cNvPr id="9" name="Text Placeholder 8"/>
+          <p:cNvSpPr>
+            <a:spLocks noGrp="1"/>
+          </p:cNvSpPr>
+          <p:nvPr>
+            <p:ph type="body" idx="1"/>
+          </p:nvPr>
+        </p:nvSpPr>
+        <p:spPr/>
+        <p:txBody>
+          <a:bodyPr/>
+          <a:lstStyle/>
+          <a:p>
+            <a:r>
+              <a:rPr lang="en-US" dirty="0" smtClean="0"/>
+              <a:t>Debugging</a:t>
+            </a:r>
+            <a:endParaRPr lang="en-US" dirty="0"/>
+          </a:p>
+        </p:txBody>
+      </p:sp>
+      <p:sp>
+        <p:nvSpPr>
+          <p:cNvPr id="5" name="Slide Number Placeholder 4"/>
           <p:cNvSpPr>
             <a:spLocks noGrp="1"/>
           </p:cNvSpPr>
@@ -8120,7 +8513,7 @@
       </p:sp>
       <p:sp>
         <p:nvSpPr>
-          <p:cNvPr id="5" name="Footer Placeholder 4"/>
+          <p:cNvPr id="6" name="Footer Placeholder 5"/>
           <p:cNvSpPr>
             <a:spLocks noGrp="1"/>
           </p:cNvSpPr>
@@ -8143,7 +8536,7 @@
       </p:sp>
       <p:sp>
         <p:nvSpPr>
-          <p:cNvPr id="6" name="Date Placeholder 5"/>
+          <p:cNvPr id="8" name="Date Placeholder 7"/>
           <p:cNvSpPr>
             <a:spLocks noGrp="1"/>
           </p:cNvSpPr>
@@ -8156,9 +8549,9 @@
           <a:bodyPr/>
           <a:lstStyle/>
           <a:p>
-            <a:fld id="{58C37697-90A4-4007-8C23-BAAA588B27B3}" type="datetime4">
-              <a:rPr lang="en-US" smtClean="0"/>
-              <a:t>August 9, 2019</a:t>
+            <a:fld id="{2AE9CD06-5419-4F67-A0F0-D9130AC4F9A9}" type="datetime4">
+              <a:rPr lang="en-US" smtClean="0"/>
+              <a:t>August 14, 2019</a:t>
             </a:fld>
             <a:endParaRPr lang="en-US" dirty="0"/>
           </a:p>
@@ -8167,7 +8560,7 @@
     </p:spTree>
     <p:extLst>
       <p:ext uri="{BB962C8B-B14F-4D97-AF65-F5344CB8AC3E}">
-        <p14:creationId xmlns:p14="http://schemas.microsoft.com/office/powerpoint/2010/main" val="3754282911"/>
+        <p14:creationId xmlns:p14="http://schemas.microsoft.com/office/powerpoint/2010/main" val="243809950"/>
       </p:ext>
     </p:extLst>
   </p:cSld>
@@ -8306,7 +8699,7 @@
           <a:p>
             <a:fld id="{CAEF89AF-97FF-41FD-A810-843DAB910B39}" type="datetime4">
               <a:rPr lang="en-US" smtClean="0"/>
-              <a:t>August 9, 2019</a:t>
+              <a:t>August 14, 2019</a:t>
             </a:fld>
             <a:endParaRPr lang="en-US" dirty="0"/>
           </a:p>
@@ -8357,30 +8750,214 @@
           <a:bodyPr/>
           <a:lstStyle/>
           <a:p>
-            <a:endParaRPr lang="en-US"/>
-          </a:p>
-        </p:txBody>
-      </p:sp>
-      <p:sp>
-        <p:nvSpPr>
-          <p:cNvPr id="8" name="Text Placeholder 7"/>
-          <p:cNvSpPr>
-            <a:spLocks noGrp="1"/>
-          </p:cNvSpPr>
-          <p:nvPr>
-            <p:ph type="body" idx="1"/>
-          </p:nvPr>
-        </p:nvSpPr>
-        <p:spPr/>
-        <p:txBody>
-          <a:bodyPr/>
-          <a:lstStyle/>
-          <a:p>
-            <a:r>
-              <a:rPr lang="en-US" dirty="0" smtClean="0"/>
-              <a:t>Advanced Topics</a:t>
-            </a:r>
-            <a:endParaRPr lang="en-US" dirty="0"/>
+            <a:r>
+              <a:rPr lang="en-US" dirty="0" smtClean="0"/>
+              <a:t>Debugging</a:t>
+            </a:r>
+            <a:endParaRPr lang="en-US" dirty="0"/>
+          </a:p>
+        </p:txBody>
+      </p:sp>
+      <p:sp>
+        <p:nvSpPr>
+          <p:cNvPr id="8" name="Content Placeholder 7"/>
+          <p:cNvSpPr>
+            <a:spLocks noGrp="1"/>
+          </p:cNvSpPr>
+          <p:nvPr>
+            <p:ph idx="1"/>
+          </p:nvPr>
+        </p:nvSpPr>
+        <p:spPr>
+          <a:xfrm>
+            <a:off x="457200" y="1600200"/>
+            <a:ext cx="8229600" cy="4648200"/>
+          </a:xfrm>
+        </p:spPr>
+        <p:txBody>
+          <a:bodyPr>
+            <a:noAutofit/>
+          </a:bodyPr>
+          <a:lstStyle/>
+          <a:p>
+            <a:r>
+              <a:rPr lang="en-US" sz="1800" dirty="0" smtClean="0"/>
+              <a:t>Debug</a:t>
+            </a:r>
+          </a:p>
+          <a:p>
+            <a:pPr lvl="1"/>
+            <a:r>
+              <a:rPr lang="en-US" sz="1400" dirty="0" smtClean="0"/>
+              <a:t>Breakpoints </a:t>
+            </a:r>
+          </a:p>
+          <a:p>
+            <a:pPr lvl="2"/>
+            <a:r>
+              <a:rPr lang="en-US" sz="1200" dirty="0" smtClean="0"/>
+              <a:t>Pros: No change in your code. </a:t>
+            </a:r>
+          </a:p>
+          <a:p>
+            <a:pPr lvl="2"/>
+            <a:r>
+              <a:rPr lang="en-US" sz="1200" dirty="0" smtClean="0"/>
+              <a:t>Cons: </a:t>
+            </a:r>
+            <a:r>
+              <a:rPr lang="en-US" sz="1200" dirty="0" smtClean="0"/>
+              <a:t>works </a:t>
+            </a:r>
+            <a:r>
+              <a:rPr lang="en-US" sz="1200" dirty="0" smtClean="0"/>
+              <a:t>only within server. </a:t>
+            </a:r>
+          </a:p>
+          <a:p>
+            <a:pPr lvl="1"/>
+            <a:r>
+              <a:rPr lang="en-US" sz="1400" dirty="0" smtClean="0">
+                <a:solidFill>
+                  <a:schemeClr val="accent2"/>
+                </a:solidFill>
+              </a:rPr>
+              <a:t>Browser</a:t>
+            </a:r>
+            <a:r>
+              <a:rPr lang="en-US" sz="1400" dirty="0" smtClean="0">
+                <a:solidFill>
+                  <a:schemeClr val="accent2"/>
+                </a:solidFill>
+              </a:rPr>
+              <a:t>()</a:t>
+            </a:r>
+          </a:p>
+          <a:p>
+            <a:pPr lvl="2"/>
+            <a:r>
+              <a:rPr lang="en-US" sz="1200" dirty="0" smtClean="0"/>
+              <a:t>Pros</a:t>
+            </a:r>
+            <a:r>
+              <a:rPr lang="en-US" sz="1200" dirty="0"/>
+              <a:t>: Like debugger but works everywhere. </a:t>
+            </a:r>
+          </a:p>
+          <a:p>
+            <a:pPr lvl="2"/>
+            <a:r>
+              <a:rPr lang="en-US" sz="1200" dirty="0" smtClean="0"/>
+              <a:t>Cons: Changes in code. </a:t>
+            </a:r>
+            <a:endParaRPr lang="en-US" sz="1200" dirty="0" smtClean="0"/>
+          </a:p>
+          <a:p>
+            <a:pPr lvl="1"/>
+            <a:r>
+              <a:rPr lang="en-US" sz="1400" dirty="0" smtClean="0"/>
+              <a:t>Print()</a:t>
+            </a:r>
+          </a:p>
+          <a:p>
+            <a:pPr lvl="2"/>
+            <a:r>
+              <a:rPr lang="en-US" sz="1200" dirty="0" smtClean="0"/>
+              <a:t>Add messages that are printed to the console. </a:t>
+            </a:r>
+          </a:p>
+          <a:p>
+            <a:pPr lvl="2"/>
+            <a:r>
+              <a:rPr lang="en-US" sz="1200" dirty="0" smtClean="0"/>
+              <a:t>Pros: You can keep it in the code for PROD. </a:t>
+            </a:r>
+          </a:p>
+          <a:p>
+            <a:pPr lvl="1"/>
+            <a:r>
+              <a:rPr lang="en-US" sz="1400" dirty="0" smtClean="0"/>
+              <a:t>Showcase Mode</a:t>
+            </a:r>
+          </a:p>
+          <a:p>
+            <a:pPr lvl="2"/>
+            <a:r>
+              <a:rPr lang="en-US" sz="1200" dirty="0">
+                <a:hlinkClick r:id="rId2"/>
+              </a:rPr>
+              <a:t>https://shiny.rstudio.com/gallery/kmeans-example.html</a:t>
+            </a:r>
+            <a:endParaRPr lang="en-US" sz="1200" dirty="0" smtClean="0"/>
+          </a:p>
+          <a:p>
+            <a:pPr lvl="2"/>
+            <a:r>
+              <a:rPr lang="en-US" sz="1200" dirty="0" err="1" smtClean="0"/>
+              <a:t>runApp</a:t>
+            </a:r>
+            <a:r>
+              <a:rPr lang="en-US" sz="1200" dirty="0" smtClean="0"/>
+              <a:t>(…, </a:t>
+            </a:r>
+            <a:r>
+              <a:rPr lang="en-US" sz="1200" dirty="0" err="1" smtClean="0"/>
+              <a:t>display.mode</a:t>
+            </a:r>
+            <a:r>
+              <a:rPr lang="en-US" sz="1200" dirty="0" smtClean="0"/>
+              <a:t> </a:t>
+            </a:r>
+            <a:r>
+              <a:rPr lang="en-US" sz="1200" dirty="0"/>
+              <a:t>= "</a:t>
+            </a:r>
+            <a:r>
+              <a:rPr lang="en-US" sz="1200" dirty="0" smtClean="0"/>
+              <a:t>showcase“)</a:t>
+            </a:r>
+          </a:p>
+          <a:p>
+            <a:pPr lvl="1"/>
+            <a:r>
+              <a:rPr lang="en-US" sz="1400" dirty="0" err="1" smtClean="0"/>
+              <a:t>shiny.reactlog</a:t>
+            </a:r>
+            <a:endParaRPr lang="en-US" sz="1400" dirty="0" smtClean="0"/>
+          </a:p>
+          <a:p>
+            <a:pPr lvl="2"/>
+            <a:r>
+              <a:rPr lang="en-US" sz="1200" dirty="0" smtClean="0"/>
+              <a:t>Detailed look at shiny reactivity.  </a:t>
+            </a:r>
+            <a:endParaRPr lang="en-US" sz="1400" dirty="0"/>
+          </a:p>
+          <a:p>
+            <a:r>
+              <a:rPr lang="en-US" sz="1800" dirty="0" smtClean="0"/>
+              <a:t>Performance </a:t>
+            </a:r>
+            <a:r>
+              <a:rPr lang="en-US" sz="1800" dirty="0" smtClean="0"/>
+              <a:t>Optimization</a:t>
+            </a:r>
+          </a:p>
+          <a:p>
+            <a:pPr lvl="1"/>
+            <a:r>
+              <a:rPr lang="en-US" sz="1400" dirty="0" err="1" smtClean="0"/>
+              <a:t>Profvis</a:t>
+            </a:r>
+            <a:endParaRPr lang="en-US" sz="1400" dirty="0" smtClean="0"/>
+          </a:p>
+          <a:p>
+            <a:pPr lvl="2"/>
+            <a:r>
+              <a:rPr lang="en-US" sz="1000" dirty="0" smtClean="0"/>
+              <a:t>Find which calculation is taking time. </a:t>
+            </a:r>
+            <a:endParaRPr lang="en-US" sz="1000" dirty="0" smtClean="0"/>
           </a:p>
         </p:txBody>
       </p:sp>
@@ -8445,24 +9022,132 @@
           <a:bodyPr/>
           <a:lstStyle/>
           <a:p>
-            <a:fld id="{CAEF89AF-97FF-41FD-A810-843DAB910B39}" type="datetime4">
-              <a:rPr lang="en-US" smtClean="0"/>
-              <a:t>August 9, 2019</a:t>
+            <a:fld id="{58C37697-90A4-4007-8C23-BAAA588B27B3}" type="datetime4">
+              <a:rPr lang="en-US" smtClean="0"/>
+              <a:t>August 14, 2019</a:t>
             </a:fld>
             <a:endParaRPr lang="en-US" dirty="0"/>
           </a:p>
         </p:txBody>
       </p:sp>
+      <p:sp>
+        <p:nvSpPr>
+          <p:cNvPr id="2" name="Right Bracket 1"/>
+          <p:cNvSpPr/>
+          <p:nvPr/>
+        </p:nvSpPr>
+        <p:spPr>
+          <a:xfrm>
+            <a:off x="4800600" y="1981200"/>
+            <a:ext cx="301752" cy="1295400"/>
+          </a:xfrm>
+          <a:prstGeom prst="rightBracket">
+            <a:avLst/>
+          </a:prstGeom>
+        </p:spPr>
+        <p:style>
+          <a:lnRef idx="3">
+            <a:schemeClr val="accent2"/>
+          </a:lnRef>
+          <a:fillRef idx="0">
+            <a:schemeClr val="accent2"/>
+          </a:fillRef>
+          <a:effectRef idx="2">
+            <a:schemeClr val="accent2"/>
+          </a:effectRef>
+          <a:fontRef idx="minor">
+            <a:schemeClr val="tx1"/>
+          </a:fontRef>
+        </p:style>
+        <p:txBody>
+          <a:bodyPr rtlCol="0" anchor="ctr"/>
+          <a:lstStyle/>
+          <a:p>
+            <a:pPr algn="ctr"/>
+            <a:endParaRPr lang="en-US"/>
+          </a:p>
+        </p:txBody>
+      </p:sp>
+      <p:sp>
+        <p:nvSpPr>
+          <p:cNvPr id="3" name="TextBox 2"/>
+          <p:cNvSpPr txBox="1"/>
+          <p:nvPr/>
+        </p:nvSpPr>
+        <p:spPr>
+          <a:xfrm>
+            <a:off x="5334000" y="2076271"/>
+            <a:ext cx="3505201" cy="1200329"/>
+          </a:xfrm>
+          <a:prstGeom prst="rect">
+            <a:avLst/>
+          </a:prstGeom>
+          <a:noFill/>
+        </p:spPr>
+        <p:txBody>
+          <a:bodyPr wrap="square" rtlCol="0">
+            <a:spAutoFit/>
+          </a:bodyPr>
+          <a:lstStyle/>
+          <a:p>
+            <a:r>
+              <a:rPr lang="en-US" dirty="0"/>
+              <a:t>Activate “debugger” where you can look around </a:t>
+            </a:r>
+            <a:r>
+              <a:rPr lang="en-US" dirty="0" smtClean="0"/>
+              <a:t>while </a:t>
+            </a:r>
+            <a:r>
+              <a:rPr lang="en-US" dirty="0"/>
+              <a:t>everything is suspended as is.  </a:t>
+            </a:r>
+          </a:p>
+          <a:p>
+            <a:endParaRPr lang="en-US" dirty="0"/>
+          </a:p>
+        </p:txBody>
+      </p:sp>
+      <p:pic>
+        <p:nvPicPr>
+          <p:cNvPr id="10" name="Picture 9"/>
+          <p:cNvPicPr>
+            <a:picLocks noChangeAspect="1"/>
+          </p:cNvPicPr>
+          <p:nvPr/>
+        </p:nvPicPr>
+        <p:blipFill rotWithShape="1">
+          <a:blip r:embed="rId3"/>
+          <a:srcRect r="14161"/>
+          <a:stretch/>
+        </p:blipFill>
+        <p:spPr>
+          <a:xfrm>
+            <a:off x="5503334" y="3132185"/>
+            <a:ext cx="3335867" cy="1240971"/>
+          </a:xfrm>
+          <a:prstGeom prst="rect">
+            <a:avLst/>
+          </a:prstGeom>
+        </p:spPr>
+      </p:pic>
     </p:spTree>
     <p:extLst>
       <p:ext uri="{BB962C8B-B14F-4D97-AF65-F5344CB8AC3E}">
-        <p14:creationId xmlns:p14="http://schemas.microsoft.com/office/powerpoint/2010/main" val="2659594775"/>
+        <p14:creationId xmlns:p14="http://schemas.microsoft.com/office/powerpoint/2010/main" val="3754282911"/>
       </p:ext>
     </p:extLst>
   </p:cSld>
   <p:clrMapOvr>
     <a:masterClrMapping/>
   </p:clrMapOvr>
+  <p:timing>
+    <p:tnLst>
+      <p:par>
+        <p:cTn id="1" dur="indefinite" restart="never" nodeType="tmRoot"/>
+      </p:par>
+    </p:tnLst>
+  </p:timing>
 </p:sld>
 </file>
 
@@ -8485,7 +9170,7 @@
       </p:grpSpPr>
       <p:sp>
         <p:nvSpPr>
-          <p:cNvPr id="7" name="Title 6"/>
+          <p:cNvPr id="2" name="Title 1"/>
           <p:cNvSpPr>
             <a:spLocks noGrp="1"/>
           </p:cNvSpPr>
@@ -8500,15 +9185,15 @@
           <a:p>
             <a:r>
               <a:rPr lang="en-US" dirty="0" smtClean="0"/>
-              <a:t>Futures &amp; Promises</a:t>
-            </a:r>
-            <a:endParaRPr lang="en-US" dirty="0"/>
-          </a:p>
-        </p:txBody>
-      </p:sp>
-      <p:sp>
-        <p:nvSpPr>
-          <p:cNvPr id="8" name="Content Placeholder 7"/>
+              <a:t>2.1 Exercise</a:t>
+            </a:r>
+            <a:endParaRPr lang="en-US" dirty="0"/>
+          </a:p>
+        </p:txBody>
+      </p:sp>
+      <p:sp>
+        <p:nvSpPr>
+          <p:cNvPr id="3" name="Content Placeholder 2"/>
           <p:cNvSpPr>
             <a:spLocks noGrp="1"/>
           </p:cNvSpPr>
@@ -8521,7 +9206,35 @@
           <a:bodyPr/>
           <a:lstStyle/>
           <a:p>
-            <a:endParaRPr lang="en-US"/>
+            <a:r>
+              <a:rPr lang="en-US" dirty="0" smtClean="0"/>
+              <a:t>Open App1.6_DynamicUI. </a:t>
+            </a:r>
+          </a:p>
+          <a:p>
+            <a:r>
+              <a:rPr lang="en-US" dirty="0" smtClean="0"/>
+              <a:t>Figure out why this error flashes using browser():</a:t>
+            </a:r>
+          </a:p>
+          <a:p>
+            <a:endParaRPr lang="en-US" dirty="0"/>
+          </a:p>
+          <a:p>
+            <a:endParaRPr lang="en-US" dirty="0" smtClean="0"/>
+          </a:p>
+          <a:p>
+            <a:r>
+              <a:rPr lang="en-US" dirty="0" smtClean="0"/>
+              <a:t>Find a solution for getting rid of it. </a:t>
+            </a:r>
+            <a:r>
+              <a:rPr lang="en-US" dirty="0" smtClean="0"/>
+              <a:t> </a:t>
+            </a:r>
+          </a:p>
+          <a:p>
+            <a:endParaRPr lang="en-US" dirty="0"/>
           </a:p>
         </p:txBody>
       </p:sp>
@@ -8586,18 +9299,42 @@
           <a:bodyPr/>
           <a:lstStyle/>
           <a:p>
-            <a:fld id="{58C37697-90A4-4007-8C23-BAAA588B27B3}" type="datetime4">
-              <a:rPr lang="en-US" smtClean="0"/>
-              <a:t>August 9, 2019</a:t>
+            <a:fld id="{CAEF89AF-97FF-41FD-A810-843DAB910B39}" type="datetime4">
+              <a:rPr lang="en-US" smtClean="0"/>
+              <a:t>August 14, 2019</a:t>
             </a:fld>
             <a:endParaRPr lang="en-US" dirty="0"/>
           </a:p>
         </p:txBody>
       </p:sp>
+      <p:pic>
+        <p:nvPicPr>
+          <p:cNvPr id="8" name="Picture 7"/>
+          <p:cNvPicPr>
+            <a:picLocks noChangeAspect="1"/>
+          </p:cNvPicPr>
+          <p:nvPr/>
+        </p:nvPicPr>
+        <p:blipFill>
+          <a:blip r:embed="rId2"/>
+          <a:stretch>
+            <a:fillRect/>
+          </a:stretch>
+        </p:blipFill>
+        <p:spPr>
+          <a:xfrm>
+            <a:off x="1219200" y="3352800"/>
+            <a:ext cx="7295444" cy="381000"/>
+          </a:xfrm>
+          <a:prstGeom prst="rect">
+            <a:avLst/>
+          </a:prstGeom>
+        </p:spPr>
+      </p:pic>
     </p:spTree>
     <p:extLst>
       <p:ext uri="{BB962C8B-B14F-4D97-AF65-F5344CB8AC3E}">
-        <p14:creationId xmlns:p14="http://schemas.microsoft.com/office/powerpoint/2010/main" val="3939692368"/>
+        <p14:creationId xmlns:p14="http://schemas.microsoft.com/office/powerpoint/2010/main" val="3966633738"/>
       </p:ext>
     </p:extLst>
   </p:cSld>
@@ -8641,7 +9378,7 @@
           <a:p>
             <a:r>
               <a:rPr lang="en-US" dirty="0" smtClean="0"/>
-              <a:t>Use of Module</a:t>
+              <a:t>Error Handling</a:t>
             </a:r>
             <a:endParaRPr lang="en-US" dirty="0"/>
           </a:p>
@@ -8662,7 +9399,78 @@
           <a:bodyPr/>
           <a:lstStyle/>
           <a:p>
-            <a:endParaRPr lang="en-US"/>
+            <a:r>
+              <a:rPr lang="en-US" dirty="0" smtClean="0"/>
+              <a:t>Base R</a:t>
+            </a:r>
+          </a:p>
+          <a:p>
+            <a:pPr lvl="1"/>
+            <a:r>
+              <a:rPr lang="en-US" dirty="0" err="1" smtClean="0"/>
+              <a:t>tryCatch</a:t>
+            </a:r>
+            <a:endParaRPr lang="en-US" dirty="0" smtClean="0"/>
+          </a:p>
+          <a:p>
+            <a:r>
+              <a:rPr lang="en-US" dirty="0" smtClean="0"/>
+              <a:t>Shiny</a:t>
+            </a:r>
+          </a:p>
+          <a:p>
+            <a:pPr lvl="1"/>
+            <a:r>
+              <a:rPr lang="en-US" dirty="0" smtClean="0"/>
+              <a:t>Validate(need(…, message = “”))</a:t>
+            </a:r>
+          </a:p>
+          <a:p>
+            <a:pPr lvl="1"/>
+            <a:r>
+              <a:rPr lang="en-US" dirty="0" smtClean="0">
+                <a:solidFill>
+                  <a:srgbClr val="C00000"/>
+                </a:solidFill>
+              </a:rPr>
+              <a:t>options(</a:t>
+            </a:r>
+            <a:r>
+              <a:rPr lang="en-US" dirty="0" err="1" smtClean="0">
+                <a:solidFill>
+                  <a:srgbClr val="C00000"/>
+                </a:solidFill>
+              </a:rPr>
+              <a:t>shiny.sanitize.errors</a:t>
+            </a:r>
+            <a:r>
+              <a:rPr lang="en-US" dirty="0" smtClean="0">
+                <a:solidFill>
+                  <a:srgbClr val="C00000"/>
+                </a:solidFill>
+              </a:rPr>
+              <a:t> = TRUE) for PROD</a:t>
+            </a:r>
+            <a:endParaRPr lang="en-US" dirty="0">
+              <a:solidFill>
+                <a:srgbClr val="C00000"/>
+              </a:solidFill>
+            </a:endParaRPr>
+          </a:p>
+          <a:p>
+            <a:pPr lvl="1"/>
+            <a:r>
+              <a:rPr lang="en-US" dirty="0" err="1" smtClean="0"/>
+              <a:t>safeError</a:t>
+            </a:r>
+            <a:r>
+              <a:rPr lang="en-US" dirty="0" smtClean="0"/>
+              <a:t>() for controlled error messages. </a:t>
+            </a:r>
+          </a:p>
+          <a:p>
+            <a:pPr lvl="1"/>
+            <a:endParaRPr lang="en-US" dirty="0"/>
           </a:p>
         </p:txBody>
       </p:sp>
@@ -8729,7 +9537,7 @@
           <a:p>
             <a:fld id="{CAEF89AF-97FF-41FD-A810-843DAB910B39}" type="datetime4">
               <a:rPr lang="en-US" smtClean="0"/>
-              <a:t>August 9, 2019</a:t>
+              <a:t>August 14, 2019</a:t>
             </a:fld>
             <a:endParaRPr lang="en-US" dirty="0"/>
           </a:p>
@@ -8738,7 +9546,7 @@
     </p:spTree>
     <p:extLst>
       <p:ext uri="{BB962C8B-B14F-4D97-AF65-F5344CB8AC3E}">
-        <p14:creationId xmlns:p14="http://schemas.microsoft.com/office/powerpoint/2010/main" val="2266987079"/>
+        <p14:creationId xmlns:p14="http://schemas.microsoft.com/office/powerpoint/2010/main" val="4068815668"/>
       </p:ext>
     </p:extLst>
   </p:cSld>
@@ -8782,7 +9590,7 @@
           <a:p>
             <a:r>
               <a:rPr lang="en-US" dirty="0" smtClean="0"/>
-              <a:t>Shiny App As Package</a:t>
+              <a:t>2.2 Exercise</a:t>
             </a:r>
             <a:endParaRPr lang="en-US" dirty="0"/>
           </a:p>
@@ -8803,7 +9611,35 @@
           <a:bodyPr/>
           <a:lstStyle/>
           <a:p>
-            <a:endParaRPr lang="en-US"/>
+            <a:r>
+              <a:rPr lang="en-US" dirty="0" smtClean="0"/>
+              <a:t>Rid of validate() for data imports. </a:t>
+            </a:r>
+          </a:p>
+          <a:p>
+            <a:r>
+              <a:rPr lang="en-US" dirty="0" smtClean="0"/>
+              <a:t>Add safe error. </a:t>
+            </a:r>
+          </a:p>
+          <a:p>
+            <a:r>
+              <a:rPr lang="en-US" dirty="0" smtClean="0"/>
+              <a:t>Set </a:t>
+            </a:r>
+            <a:r>
+              <a:rPr lang="en-US" dirty="0"/>
+              <a:t>global options for </a:t>
+            </a:r>
+            <a:r>
+              <a:rPr lang="en-US" dirty="0" err="1" smtClean="0"/>
+              <a:t>Sanitize.errors</a:t>
+            </a:r>
+            <a:r>
+              <a:rPr lang="en-US" dirty="0" smtClean="0"/>
+              <a:t>. </a:t>
+            </a:r>
+            <a:endParaRPr lang="en-US" dirty="0"/>
           </a:p>
         </p:txBody>
       </p:sp>
@@ -8870,7 +9706,7 @@
           <a:p>
             <a:fld id="{CAEF89AF-97FF-41FD-A810-843DAB910B39}" type="datetime4">
               <a:rPr lang="en-US" smtClean="0"/>
-              <a:t>August 9, 2019</a:t>
+              <a:t>August 14, 2019</a:t>
             </a:fld>
             <a:endParaRPr lang="en-US" dirty="0"/>
           </a:p>
@@ -8879,7 +9715,1295 @@
     </p:spTree>
     <p:extLst>
       <p:ext uri="{BB962C8B-B14F-4D97-AF65-F5344CB8AC3E}">
-        <p14:creationId xmlns:p14="http://schemas.microsoft.com/office/powerpoint/2010/main" val="3898009327"/>
+        <p14:creationId xmlns:p14="http://schemas.microsoft.com/office/powerpoint/2010/main" val="4028345403"/>
+      </p:ext>
+    </p:extLst>
+  </p:cSld>
+  <p:clrMapOvr>
+    <a:masterClrMapping/>
+  </p:clrMapOvr>
+</p:sld>
+</file>
+
+<file path=ppt/slides/slide34.xml><?xml version="1.0" encoding="utf-8"?>
+<p:sld xmlns:a="http://schemas.openxmlformats.org/drawingml/2006/main" xmlns:r="http://schemas.openxmlformats.org/officeDocument/2006/relationships" xmlns:p="http://schemas.openxmlformats.org/presentationml/2006/main">
+  <p:cSld>
+    <p:spTree>
+      <p:nvGrpSpPr>
+        <p:cNvPr id="1" name=""/>
+        <p:cNvGrpSpPr/>
+        <p:nvPr/>
+      </p:nvGrpSpPr>
+      <p:grpSpPr>
+        <a:xfrm>
+          <a:off x="0" y="0"/>
+          <a:ext cx="0" cy="0"/>
+          <a:chOff x="0" y="0"/>
+          <a:chExt cx="0" cy="0"/>
+        </a:xfrm>
+      </p:grpSpPr>
+      <p:sp>
+        <p:nvSpPr>
+          <p:cNvPr id="7" name="Title 6"/>
+          <p:cNvSpPr>
+            <a:spLocks noGrp="1"/>
+          </p:cNvSpPr>
+          <p:nvPr>
+            <p:ph type="title"/>
+          </p:nvPr>
+        </p:nvSpPr>
+        <p:spPr/>
+        <p:txBody>
+          <a:bodyPr/>
+          <a:lstStyle/>
+          <a:p>
+            <a:r>
+              <a:rPr lang="en-US" dirty="0"/>
+              <a:t>Advanced Topics</a:t>
+            </a:r>
+            <a:br>
+              <a:rPr lang="en-US" dirty="0"/>
+            </a:br>
+            <a:endParaRPr lang="en-US" dirty="0"/>
+          </a:p>
+        </p:txBody>
+      </p:sp>
+      <p:sp>
+        <p:nvSpPr>
+          <p:cNvPr id="8" name="Text Placeholder 7"/>
+          <p:cNvSpPr>
+            <a:spLocks noGrp="1"/>
+          </p:cNvSpPr>
+          <p:nvPr>
+            <p:ph type="body" idx="1"/>
+          </p:nvPr>
+        </p:nvSpPr>
+        <p:spPr/>
+        <p:txBody>
+          <a:bodyPr/>
+          <a:lstStyle/>
+          <a:p>
+            <a:r>
+              <a:rPr lang="en-US" dirty="0"/>
+              <a:t>Use of Module</a:t>
+            </a:r>
+          </a:p>
+        </p:txBody>
+      </p:sp>
+      <p:sp>
+        <p:nvSpPr>
+          <p:cNvPr id="4" name="Slide Number Placeholder 3"/>
+          <p:cNvSpPr>
+            <a:spLocks noGrp="1"/>
+          </p:cNvSpPr>
+          <p:nvPr>
+            <p:ph type="sldNum" sz="quarter" idx="12"/>
+          </p:nvPr>
+        </p:nvSpPr>
+        <p:spPr/>
+        <p:txBody>
+          <a:bodyPr/>
+          <a:lstStyle/>
+          <a:p>
+            <a:fld id="{8848E627-D06A-4F0E-98E2-3D90458BE48C}" type="slidenum">
+              <a:rPr lang="en-US" smtClean="0"/>
+              <a:t>34</a:t>
+            </a:fld>
+            <a:endParaRPr lang="en-US"/>
+          </a:p>
+        </p:txBody>
+      </p:sp>
+      <p:sp>
+        <p:nvSpPr>
+          <p:cNvPr id="5" name="Footer Placeholder 4"/>
+          <p:cNvSpPr>
+            <a:spLocks noGrp="1"/>
+          </p:cNvSpPr>
+          <p:nvPr>
+            <p:ph type="ftr" sz="quarter" idx="3"/>
+          </p:nvPr>
+        </p:nvSpPr>
+        <p:spPr/>
+        <p:txBody>
+          <a:bodyPr/>
+          <a:lstStyle/>
+          <a:p>
+            <a:r>
+              <a:rPr lang="en-US" smtClean="0"/>
+              <a:t>CONFIDENTIAL &amp; PROPRIETARY</a:t>
+            </a:r>
+            <a:endParaRPr lang="en-US" dirty="0"/>
+          </a:p>
+        </p:txBody>
+      </p:sp>
+      <p:sp>
+        <p:nvSpPr>
+          <p:cNvPr id="6" name="Date Placeholder 5"/>
+          <p:cNvSpPr>
+            <a:spLocks noGrp="1"/>
+          </p:cNvSpPr>
+          <p:nvPr>
+            <p:ph type="dt" sz="half" idx="10"/>
+          </p:nvPr>
+        </p:nvSpPr>
+        <p:spPr/>
+        <p:txBody>
+          <a:bodyPr/>
+          <a:lstStyle/>
+          <a:p>
+            <a:fld id="{CAEF89AF-97FF-41FD-A810-843DAB910B39}" type="datetime4">
+              <a:rPr lang="en-US" smtClean="0"/>
+              <a:t>August 14, 2019</a:t>
+            </a:fld>
+            <a:endParaRPr lang="en-US" dirty="0"/>
+          </a:p>
+        </p:txBody>
+      </p:sp>
+    </p:spTree>
+    <p:extLst>
+      <p:ext uri="{BB962C8B-B14F-4D97-AF65-F5344CB8AC3E}">
+        <p14:creationId xmlns:p14="http://schemas.microsoft.com/office/powerpoint/2010/main" val="1822175693"/>
+      </p:ext>
+    </p:extLst>
+  </p:cSld>
+  <p:clrMapOvr>
+    <a:masterClrMapping/>
+  </p:clrMapOvr>
+</p:sld>
+</file>
+
+<file path=ppt/slides/slide35.xml><?xml version="1.0" encoding="utf-8"?>
+<p:sld xmlns:a="http://schemas.openxmlformats.org/drawingml/2006/main" xmlns:r="http://schemas.openxmlformats.org/officeDocument/2006/relationships" xmlns:p="http://schemas.openxmlformats.org/presentationml/2006/main">
+  <p:cSld>
+    <p:spTree>
+      <p:nvGrpSpPr>
+        <p:cNvPr id="1" name=""/>
+        <p:cNvGrpSpPr/>
+        <p:nvPr/>
+      </p:nvGrpSpPr>
+      <p:grpSpPr>
+        <a:xfrm>
+          <a:off x="0" y="0"/>
+          <a:ext cx="0" cy="0"/>
+          <a:chOff x="0" y="0"/>
+          <a:chExt cx="0" cy="0"/>
+        </a:xfrm>
+      </p:grpSpPr>
+      <p:sp>
+        <p:nvSpPr>
+          <p:cNvPr id="7" name="Title 6"/>
+          <p:cNvSpPr>
+            <a:spLocks noGrp="1"/>
+          </p:cNvSpPr>
+          <p:nvPr>
+            <p:ph type="title"/>
+          </p:nvPr>
+        </p:nvSpPr>
+        <p:spPr/>
+        <p:txBody>
+          <a:bodyPr/>
+          <a:lstStyle/>
+          <a:p>
+            <a:r>
+              <a:rPr lang="en-US" dirty="0"/>
+              <a:t>software design technique</a:t>
+            </a:r>
+          </a:p>
+        </p:txBody>
+      </p:sp>
+      <p:sp>
+        <p:nvSpPr>
+          <p:cNvPr id="8" name="Content Placeholder 7"/>
+          <p:cNvSpPr>
+            <a:spLocks noGrp="1"/>
+          </p:cNvSpPr>
+          <p:nvPr>
+            <p:ph idx="1"/>
+          </p:nvPr>
+        </p:nvSpPr>
+        <p:spPr>
+          <a:xfrm>
+            <a:off x="457200" y="1600200"/>
+            <a:ext cx="8229600" cy="1524000"/>
+          </a:xfrm>
+        </p:spPr>
+        <p:txBody>
+          <a:bodyPr>
+            <a:normAutofit fontScale="77500" lnSpcReduction="20000"/>
+          </a:bodyPr>
+          <a:lstStyle/>
+          <a:p>
+            <a:r>
+              <a:rPr lang="en-US" dirty="0" smtClean="0"/>
+              <a:t>Fact: As we develop more shiny apps, we get closer to </a:t>
+            </a:r>
+            <a:r>
+              <a:rPr lang="en-US" dirty="0" smtClean="0"/>
+              <a:t>web programmers</a:t>
+            </a:r>
+            <a:r>
+              <a:rPr lang="en-US" dirty="0" smtClean="0"/>
+              <a:t>. Adopt some of their techniques to start with. </a:t>
+            </a:r>
+          </a:p>
+          <a:p>
+            <a:pPr lvl="1"/>
+            <a:r>
+              <a:rPr lang="en-US" dirty="0" smtClean="0"/>
+              <a:t>We already talked about separation of Dev/Staging/PROD environments. </a:t>
+            </a:r>
+          </a:p>
+        </p:txBody>
+      </p:sp>
+      <p:sp>
+        <p:nvSpPr>
+          <p:cNvPr id="4" name="Slide Number Placeholder 3"/>
+          <p:cNvSpPr>
+            <a:spLocks noGrp="1"/>
+          </p:cNvSpPr>
+          <p:nvPr>
+            <p:ph type="sldNum" sz="quarter" idx="12"/>
+          </p:nvPr>
+        </p:nvSpPr>
+        <p:spPr/>
+        <p:txBody>
+          <a:bodyPr/>
+          <a:lstStyle/>
+          <a:p>
+            <a:fld id="{8848E627-D06A-4F0E-98E2-3D90458BE48C}" type="slidenum">
+              <a:rPr lang="en-US" smtClean="0"/>
+              <a:t>35</a:t>
+            </a:fld>
+            <a:endParaRPr lang="en-US"/>
+          </a:p>
+        </p:txBody>
+      </p:sp>
+      <p:sp>
+        <p:nvSpPr>
+          <p:cNvPr id="5" name="Footer Placeholder 4"/>
+          <p:cNvSpPr>
+            <a:spLocks noGrp="1"/>
+          </p:cNvSpPr>
+          <p:nvPr>
+            <p:ph type="ftr" sz="quarter" idx="3"/>
+          </p:nvPr>
+        </p:nvSpPr>
+        <p:spPr/>
+        <p:txBody>
+          <a:bodyPr/>
+          <a:lstStyle/>
+          <a:p>
+            <a:r>
+              <a:rPr lang="en-US" smtClean="0"/>
+              <a:t>CONFIDENTIAL &amp; PROPRIETARY</a:t>
+            </a:r>
+            <a:endParaRPr lang="en-US" dirty="0"/>
+          </a:p>
+        </p:txBody>
+      </p:sp>
+      <p:sp>
+        <p:nvSpPr>
+          <p:cNvPr id="6" name="Date Placeholder 5"/>
+          <p:cNvSpPr>
+            <a:spLocks noGrp="1"/>
+          </p:cNvSpPr>
+          <p:nvPr>
+            <p:ph type="dt" sz="half" idx="10"/>
+          </p:nvPr>
+        </p:nvSpPr>
+        <p:spPr/>
+        <p:txBody>
+          <a:bodyPr/>
+          <a:lstStyle/>
+          <a:p>
+            <a:fld id="{58C37697-90A4-4007-8C23-BAAA588B27B3}" type="datetime4">
+              <a:rPr lang="en-US" smtClean="0"/>
+              <a:t>August 14, 2019</a:t>
+            </a:fld>
+            <a:endParaRPr lang="en-US" dirty="0"/>
+          </a:p>
+        </p:txBody>
+      </p:sp>
+      <p:pic>
+        <p:nvPicPr>
+          <p:cNvPr id="1026" name="Picture 2" descr="Image result for modularization programming"/>
+          <p:cNvPicPr>
+            <a:picLocks noChangeAspect="1" noChangeArrowheads="1"/>
+          </p:cNvPicPr>
+          <p:nvPr/>
+        </p:nvPicPr>
+        <p:blipFill>
+          <a:blip r:embed="rId2" cstate="print">
+            <a:extLst>
+              <a:ext uri="{28A0092B-C50C-407E-A947-70E740481C1C}">
+                <a14:useLocalDpi xmlns:a14="http://schemas.microsoft.com/office/drawing/2010/main" val="0"/>
+              </a:ext>
+            </a:extLst>
+          </a:blip>
+          <a:srcRect/>
+          <a:stretch>
+            <a:fillRect/>
+          </a:stretch>
+        </p:blipFill>
+        <p:spPr bwMode="auto">
+          <a:xfrm>
+            <a:off x="5867400" y="3818650"/>
+            <a:ext cx="3009900" cy="1979774"/>
+          </a:xfrm>
+          <a:prstGeom prst="rect">
+            <a:avLst/>
+          </a:prstGeom>
+          <a:noFill/>
+          <a:extLst>
+            <a:ext uri="{909E8E84-426E-40DD-AFC4-6F175D3DCCD1}">
+              <a14:hiddenFill xmlns:a14="http://schemas.microsoft.com/office/drawing/2010/main">
+                <a:solidFill>
+                  <a:srgbClr val="FFFFFF"/>
+                </a:solidFill>
+              </a14:hiddenFill>
+            </a:ext>
+          </a:extLst>
+        </p:spPr>
+      </p:pic>
+      <p:sp>
+        <p:nvSpPr>
+          <p:cNvPr id="10" name="Content Placeholder 7"/>
+          <p:cNvSpPr txBox="1">
+            <a:spLocks/>
+          </p:cNvSpPr>
+          <p:nvPr/>
+        </p:nvSpPr>
+        <p:spPr>
+          <a:xfrm>
+            <a:off x="457200" y="2971800"/>
+            <a:ext cx="5334000" cy="3234530"/>
+          </a:xfrm>
+          <a:prstGeom prst="rect">
+            <a:avLst/>
+          </a:prstGeom>
+        </p:spPr>
+        <p:txBody>
+          <a:bodyPr vert="horz" lIns="91440" tIns="45720" rIns="91440" bIns="45720" rtlCol="0">
+            <a:normAutofit fontScale="77500" lnSpcReduction="20000"/>
+          </a:bodyPr>
+          <a:lstStyle>
+            <a:lvl1pPr marL="342900" indent="-342900" algn="l" defTabSz="914400" rtl="0" eaLnBrk="1" latinLnBrk="0" hangingPunct="1">
+              <a:spcBef>
+                <a:spcPct val="20000"/>
+              </a:spcBef>
+              <a:buFont typeface="Arial" panose="020B0604020202020204" pitchFamily="34" charset="0"/>
+              <a:buChar char="•"/>
+              <a:defRPr sz="3200" kern="1200">
+                <a:solidFill>
+                  <a:schemeClr val="tx1"/>
+                </a:solidFill>
+                <a:latin typeface="Calibri Light" panose="020F0302020204030204" pitchFamily="34" charset="0"/>
+                <a:ea typeface="+mn-ea"/>
+                <a:cs typeface="+mn-cs"/>
+              </a:defRPr>
+            </a:lvl1pPr>
+            <a:lvl2pPr marL="742950" indent="-285750" algn="l" defTabSz="914400" rtl="0" eaLnBrk="1" latinLnBrk="0" hangingPunct="1">
+              <a:spcBef>
+                <a:spcPct val="20000"/>
+              </a:spcBef>
+              <a:buFont typeface="Arial" panose="020B0604020202020204" pitchFamily="34" charset="0"/>
+              <a:buChar char="–"/>
+              <a:defRPr sz="2800" kern="1200">
+                <a:solidFill>
+                  <a:schemeClr val="tx1"/>
+                </a:solidFill>
+                <a:latin typeface="Calibri Light" panose="020F0302020204030204" pitchFamily="34" charset="0"/>
+                <a:ea typeface="+mn-ea"/>
+                <a:cs typeface="+mn-cs"/>
+              </a:defRPr>
+            </a:lvl2pPr>
+            <a:lvl3pPr marL="1143000" indent="-228600" algn="l" defTabSz="914400" rtl="0" eaLnBrk="1" latinLnBrk="0" hangingPunct="1">
+              <a:spcBef>
+                <a:spcPct val="20000"/>
+              </a:spcBef>
+              <a:buFont typeface="Arial" panose="020B0604020202020204" pitchFamily="34" charset="0"/>
+              <a:buChar char="•"/>
+              <a:defRPr sz="2400" kern="1200">
+                <a:solidFill>
+                  <a:schemeClr val="tx1"/>
+                </a:solidFill>
+                <a:latin typeface="Calibri Light" panose="020F0302020204030204" pitchFamily="34" charset="0"/>
+                <a:ea typeface="+mn-ea"/>
+                <a:cs typeface="+mn-cs"/>
+              </a:defRPr>
+            </a:lvl3pPr>
+            <a:lvl4pPr marL="1600200" indent="-228600" algn="l" defTabSz="914400" rtl="0" eaLnBrk="1" latinLnBrk="0" hangingPunct="1">
+              <a:spcBef>
+                <a:spcPct val="20000"/>
+              </a:spcBef>
+              <a:buFont typeface="Arial" panose="020B0604020202020204" pitchFamily="34" charset="0"/>
+              <a:buChar char="–"/>
+              <a:defRPr sz="2000" kern="1200">
+                <a:solidFill>
+                  <a:schemeClr val="tx1"/>
+                </a:solidFill>
+                <a:latin typeface="Calibri Light" panose="020F0302020204030204" pitchFamily="34" charset="0"/>
+                <a:ea typeface="+mn-ea"/>
+                <a:cs typeface="+mn-cs"/>
+              </a:defRPr>
+            </a:lvl4pPr>
+            <a:lvl5pPr marL="2057400" indent="-228600" algn="l" defTabSz="914400" rtl="0" eaLnBrk="1" latinLnBrk="0" hangingPunct="1">
+              <a:spcBef>
+                <a:spcPct val="20000"/>
+              </a:spcBef>
+              <a:buFont typeface="Arial" panose="020B0604020202020204" pitchFamily="34" charset="0"/>
+              <a:buChar char="»"/>
+              <a:defRPr sz="2000" kern="1200">
+                <a:solidFill>
+                  <a:schemeClr val="tx1"/>
+                </a:solidFill>
+                <a:latin typeface="Calibri Light" panose="020F0302020204030204" pitchFamily="34" charset="0"/>
+                <a:ea typeface="+mn-ea"/>
+                <a:cs typeface="+mn-cs"/>
+              </a:defRPr>
+            </a:lvl5pPr>
+            <a:lvl6pPr marL="2514600" indent="-228600" algn="l" defTabSz="914400" rtl="0" eaLnBrk="1" latinLnBrk="0" hangingPunct="1">
+              <a:spcBef>
+                <a:spcPct val="20000"/>
+              </a:spcBef>
+              <a:buFont typeface="Arial" panose="020B0604020202020204" pitchFamily="34" charset="0"/>
+              <a:buChar char="•"/>
+              <a:defRPr sz="2000" kern="1200">
+                <a:solidFill>
+                  <a:schemeClr val="tx1"/>
+                </a:solidFill>
+                <a:latin typeface="+mn-lt"/>
+                <a:ea typeface="+mn-ea"/>
+                <a:cs typeface="+mn-cs"/>
+              </a:defRPr>
+            </a:lvl6pPr>
+            <a:lvl7pPr marL="2971800" indent="-228600" algn="l" defTabSz="914400" rtl="0" eaLnBrk="1" latinLnBrk="0" hangingPunct="1">
+              <a:spcBef>
+                <a:spcPct val="20000"/>
+              </a:spcBef>
+              <a:buFont typeface="Arial" panose="020B0604020202020204" pitchFamily="34" charset="0"/>
+              <a:buChar char="•"/>
+              <a:defRPr sz="2000" kern="1200">
+                <a:solidFill>
+                  <a:schemeClr val="tx1"/>
+                </a:solidFill>
+                <a:latin typeface="+mn-lt"/>
+                <a:ea typeface="+mn-ea"/>
+                <a:cs typeface="+mn-cs"/>
+              </a:defRPr>
+            </a:lvl7pPr>
+            <a:lvl8pPr marL="3429000" indent="-228600" algn="l" defTabSz="914400" rtl="0" eaLnBrk="1" latinLnBrk="0" hangingPunct="1">
+              <a:spcBef>
+                <a:spcPct val="20000"/>
+              </a:spcBef>
+              <a:buFont typeface="Arial" panose="020B0604020202020204" pitchFamily="34" charset="0"/>
+              <a:buChar char="•"/>
+              <a:defRPr sz="2000" kern="1200">
+                <a:solidFill>
+                  <a:schemeClr val="tx1"/>
+                </a:solidFill>
+                <a:latin typeface="+mn-lt"/>
+                <a:ea typeface="+mn-ea"/>
+                <a:cs typeface="+mn-cs"/>
+              </a:defRPr>
+            </a:lvl8pPr>
+            <a:lvl9pPr marL="3886200" indent="-228600" algn="l" defTabSz="914400" rtl="0" eaLnBrk="1" latinLnBrk="0" hangingPunct="1">
+              <a:spcBef>
+                <a:spcPct val="20000"/>
+              </a:spcBef>
+              <a:buFont typeface="Arial" panose="020B0604020202020204" pitchFamily="34" charset="0"/>
+              <a:buChar char="•"/>
+              <a:defRPr sz="2000" kern="1200">
+                <a:solidFill>
+                  <a:schemeClr val="tx1"/>
+                </a:solidFill>
+                <a:latin typeface="+mn-lt"/>
+                <a:ea typeface="+mn-ea"/>
+                <a:cs typeface="+mn-cs"/>
+              </a:defRPr>
+            </a:lvl9pPr>
+          </a:lstStyle>
+          <a:p>
+            <a:endParaRPr lang="en-US" dirty="0" smtClean="0"/>
+          </a:p>
+          <a:p>
+            <a:r>
+              <a:rPr lang="en-US" b="1" dirty="0" smtClean="0"/>
+              <a:t>Modular programming </a:t>
+            </a:r>
+            <a:r>
+              <a:rPr lang="en-US" dirty="0" smtClean="0"/>
+              <a:t>is a software design technique that emphasizes </a:t>
+            </a:r>
+            <a:r>
+              <a:rPr lang="en-US" dirty="0" smtClean="0">
+                <a:solidFill>
+                  <a:srgbClr val="C0504D"/>
+                </a:solidFill>
+              </a:rPr>
+              <a:t>separating the functionality of a program into independent, interchangeable modules</a:t>
+            </a:r>
+            <a:r>
+              <a:rPr lang="en-US" dirty="0" smtClean="0"/>
+              <a:t>, such that each contains everything necessary to execute only one aspect of the desired functionality.</a:t>
+            </a:r>
+            <a:endParaRPr lang="en-US" dirty="0"/>
+          </a:p>
+        </p:txBody>
+      </p:sp>
+    </p:spTree>
+    <p:extLst>
+      <p:ext uri="{BB962C8B-B14F-4D97-AF65-F5344CB8AC3E}">
+        <p14:creationId xmlns:p14="http://schemas.microsoft.com/office/powerpoint/2010/main" val="2281314740"/>
+      </p:ext>
+    </p:extLst>
+  </p:cSld>
+  <p:clrMapOvr>
+    <a:masterClrMapping/>
+  </p:clrMapOvr>
+</p:sld>
+</file>
+
+<file path=ppt/slides/slide36.xml><?xml version="1.0" encoding="utf-8"?>
+<p:sld xmlns:a="http://schemas.openxmlformats.org/drawingml/2006/main" xmlns:r="http://schemas.openxmlformats.org/officeDocument/2006/relationships" xmlns:p="http://schemas.openxmlformats.org/presentationml/2006/main">
+  <p:cSld>
+    <p:spTree>
+      <p:nvGrpSpPr>
+        <p:cNvPr id="1" name=""/>
+        <p:cNvGrpSpPr/>
+        <p:nvPr/>
+      </p:nvGrpSpPr>
+      <p:grpSpPr>
+        <a:xfrm>
+          <a:off x="0" y="0"/>
+          <a:ext cx="0" cy="0"/>
+          <a:chOff x="0" y="0"/>
+          <a:chExt cx="0" cy="0"/>
+        </a:xfrm>
+      </p:grpSpPr>
+      <p:sp>
+        <p:nvSpPr>
+          <p:cNvPr id="2" name="Title 1"/>
+          <p:cNvSpPr>
+            <a:spLocks noGrp="1"/>
+          </p:cNvSpPr>
+          <p:nvPr>
+            <p:ph type="title"/>
+          </p:nvPr>
+        </p:nvSpPr>
+        <p:spPr/>
+        <p:txBody>
+          <a:bodyPr/>
+          <a:lstStyle/>
+          <a:p>
+            <a:r>
+              <a:rPr lang="en-US" dirty="0" smtClean="0"/>
+              <a:t>Modularization for Shiny</a:t>
+            </a:r>
+            <a:endParaRPr lang="en-US" dirty="0"/>
+          </a:p>
+        </p:txBody>
+      </p:sp>
+      <p:sp>
+        <p:nvSpPr>
+          <p:cNvPr id="3" name="Content Placeholder 2"/>
+          <p:cNvSpPr>
+            <a:spLocks noGrp="1"/>
+          </p:cNvSpPr>
+          <p:nvPr>
+            <p:ph idx="1"/>
+          </p:nvPr>
+        </p:nvSpPr>
+        <p:spPr>
+          <a:xfrm>
+            <a:off x="457200" y="1600200"/>
+            <a:ext cx="4876800" cy="4724400"/>
+          </a:xfrm>
+        </p:spPr>
+        <p:txBody>
+          <a:bodyPr>
+            <a:normAutofit fontScale="62500" lnSpcReduction="20000"/>
+          </a:bodyPr>
+          <a:lstStyle/>
+          <a:p>
+            <a:r>
+              <a:rPr lang="en-US" dirty="0" smtClean="0"/>
+              <a:t>In R</a:t>
+            </a:r>
+          </a:p>
+          <a:p>
+            <a:pPr lvl="1">
+              <a:buFont typeface="Calibri Light" panose="020F0302020204030204" pitchFamily="34" charset="0"/>
+              <a:buChar char="→"/>
+            </a:pPr>
+            <a:r>
+              <a:rPr lang="en-US" dirty="0" smtClean="0"/>
+              <a:t> Functions</a:t>
+            </a:r>
+          </a:p>
+          <a:p>
+            <a:pPr lvl="2"/>
+            <a:r>
+              <a:rPr lang="en-US" dirty="0" smtClean="0"/>
+              <a:t>If you repeat yourself 3 times, write a function</a:t>
+            </a:r>
+          </a:p>
+          <a:p>
+            <a:pPr lvl="2"/>
+            <a:r>
+              <a:rPr lang="en-US" dirty="0" smtClean="0"/>
+              <a:t>Or once for modularization. </a:t>
+            </a:r>
+          </a:p>
+          <a:p>
+            <a:pPr lvl="1">
+              <a:buFont typeface="Calibri Light" panose="020F0302020204030204" pitchFamily="34" charset="0"/>
+              <a:buChar char="→"/>
+            </a:pPr>
+            <a:r>
+              <a:rPr lang="en-US" dirty="0" smtClean="0"/>
+              <a:t> Source</a:t>
+            </a:r>
+          </a:p>
+          <a:p>
+            <a:pPr lvl="2"/>
+            <a:r>
+              <a:rPr lang="en-US" dirty="0" smtClean="0"/>
+              <a:t>Technically not modular(?). But a technique to break up a program.  </a:t>
+            </a:r>
+          </a:p>
+          <a:p>
+            <a:r>
+              <a:rPr lang="en-US" b="1" dirty="0" smtClean="0"/>
+              <a:t>In Shiny </a:t>
+            </a:r>
+          </a:p>
+          <a:p>
+            <a:pPr lvl="1">
+              <a:buFont typeface="Calibri Light" panose="020F0302020204030204" pitchFamily="34" charset="0"/>
+              <a:buChar char="→"/>
+            </a:pPr>
+            <a:r>
+              <a:rPr lang="en-US" dirty="0" smtClean="0"/>
+              <a:t> Functions</a:t>
+            </a:r>
+          </a:p>
+          <a:p>
+            <a:pPr lvl="1">
+              <a:buFont typeface="Calibri Light" panose="020F0302020204030204" pitchFamily="34" charset="0"/>
+              <a:buChar char="→"/>
+            </a:pPr>
+            <a:r>
+              <a:rPr lang="en-US" b="1" dirty="0" smtClean="0">
+                <a:solidFill>
+                  <a:srgbClr val="C0504D"/>
+                </a:solidFill>
+              </a:rPr>
+              <a:t> Module</a:t>
+            </a:r>
+          </a:p>
+          <a:p>
+            <a:pPr lvl="2"/>
+            <a:r>
+              <a:rPr lang="en-US" dirty="0" smtClean="0"/>
+              <a:t>Originally introduced for reducing repetitions, but more and more people are using it to break the app into modular pieces. </a:t>
+            </a:r>
+          </a:p>
+          <a:p>
+            <a:pPr lvl="1">
+              <a:buFont typeface="Calibri Light" panose="020F0302020204030204" pitchFamily="34" charset="0"/>
+              <a:buChar char="→"/>
+            </a:pPr>
+            <a:endParaRPr lang="en-US" dirty="0"/>
+          </a:p>
+          <a:p>
+            <a:r>
+              <a:rPr lang="en-US" sz="2600" dirty="0" smtClean="0"/>
+              <a:t>Bad Example: HedgeFox app</a:t>
+            </a:r>
+          </a:p>
+          <a:p>
+            <a:pPr lvl="1"/>
+            <a:r>
+              <a:rPr lang="en-US" sz="1800" dirty="0" smtClean="0">
+                <a:hlinkClick r:id="rId2"/>
+              </a:rPr>
+              <a:t>https</a:t>
+            </a:r>
+            <a:r>
+              <a:rPr lang="en-US" sz="1800" dirty="0">
+                <a:hlinkClick r:id="rId2"/>
+              </a:rPr>
+              <a:t>://analyze.teainc.org/HedgeFox/PNW</a:t>
+            </a:r>
+            <a:r>
+              <a:rPr lang="en-US" sz="1800" dirty="0" smtClean="0">
+                <a:hlinkClick r:id="rId2"/>
+              </a:rPr>
+              <a:t>/</a:t>
+            </a:r>
+            <a:endParaRPr lang="en-US" sz="1800" dirty="0" smtClean="0"/>
+          </a:p>
+          <a:p>
+            <a:pPr lvl="1"/>
+            <a:r>
+              <a:rPr lang="en-US" sz="1900" dirty="0" smtClean="0">
+                <a:hlinkClick r:id="rId3"/>
+              </a:rPr>
+              <a:t>https</a:t>
+            </a:r>
+            <a:r>
+              <a:rPr lang="en-US" sz="1900" dirty="0">
+                <a:hlinkClick r:id="rId3"/>
+              </a:rPr>
+              <a:t>://</a:t>
+            </a:r>
+            <a:r>
+              <a:rPr lang="en-US" sz="1900" dirty="0" smtClean="0">
+                <a:hlinkClick r:id="rId3"/>
+              </a:rPr>
+              <a:t>github.com/TEA-Analytics/HedgeFox/blob/master/RCode/shiny-app/Common/server.r#L804</a:t>
+            </a:r>
+            <a:endParaRPr lang="en-US" sz="1900" dirty="0"/>
+          </a:p>
+          <a:p>
+            <a:pPr marL="0" indent="0">
+              <a:buNone/>
+            </a:pPr>
+            <a:endParaRPr lang="en-US" dirty="0" smtClean="0"/>
+          </a:p>
+          <a:p>
+            <a:pPr lvl="1"/>
+            <a:endParaRPr lang="en-US" dirty="0"/>
+          </a:p>
+        </p:txBody>
+      </p:sp>
+      <p:sp>
+        <p:nvSpPr>
+          <p:cNvPr id="4" name="Slide Number Placeholder 3"/>
+          <p:cNvSpPr>
+            <a:spLocks noGrp="1"/>
+          </p:cNvSpPr>
+          <p:nvPr>
+            <p:ph type="sldNum" sz="quarter" idx="12"/>
+          </p:nvPr>
+        </p:nvSpPr>
+        <p:spPr/>
+        <p:txBody>
+          <a:bodyPr/>
+          <a:lstStyle/>
+          <a:p>
+            <a:fld id="{8848E627-D06A-4F0E-98E2-3D90458BE48C}" type="slidenum">
+              <a:rPr lang="en-US" smtClean="0"/>
+              <a:t>36</a:t>
+            </a:fld>
+            <a:endParaRPr lang="en-US"/>
+          </a:p>
+        </p:txBody>
+      </p:sp>
+      <p:sp>
+        <p:nvSpPr>
+          <p:cNvPr id="5" name="Footer Placeholder 4"/>
+          <p:cNvSpPr>
+            <a:spLocks noGrp="1"/>
+          </p:cNvSpPr>
+          <p:nvPr>
+            <p:ph type="ftr" sz="quarter" idx="3"/>
+          </p:nvPr>
+        </p:nvSpPr>
+        <p:spPr/>
+        <p:txBody>
+          <a:bodyPr/>
+          <a:lstStyle/>
+          <a:p>
+            <a:r>
+              <a:rPr lang="en-US" smtClean="0"/>
+              <a:t>CONFIDENTIAL &amp; PROPRIETARY</a:t>
+            </a:r>
+            <a:endParaRPr lang="en-US" dirty="0"/>
+          </a:p>
+        </p:txBody>
+      </p:sp>
+      <p:sp>
+        <p:nvSpPr>
+          <p:cNvPr id="6" name="Date Placeholder 5"/>
+          <p:cNvSpPr>
+            <a:spLocks noGrp="1"/>
+          </p:cNvSpPr>
+          <p:nvPr>
+            <p:ph type="dt" sz="half" idx="10"/>
+          </p:nvPr>
+        </p:nvSpPr>
+        <p:spPr/>
+        <p:txBody>
+          <a:bodyPr/>
+          <a:lstStyle/>
+          <a:p>
+            <a:fld id="{CAEF89AF-97FF-41FD-A810-843DAB910B39}" type="datetime4">
+              <a:rPr lang="en-US" smtClean="0"/>
+              <a:t>August 14, 2019</a:t>
+            </a:fld>
+            <a:endParaRPr lang="en-US" dirty="0"/>
+          </a:p>
+        </p:txBody>
+      </p:sp>
+      <p:pic>
+        <p:nvPicPr>
+          <p:cNvPr id="7" name="Picture 6"/>
+          <p:cNvPicPr>
+            <a:picLocks noChangeAspect="1"/>
+          </p:cNvPicPr>
+          <p:nvPr/>
+        </p:nvPicPr>
+        <p:blipFill>
+          <a:blip r:embed="rId4"/>
+          <a:stretch>
+            <a:fillRect/>
+          </a:stretch>
+        </p:blipFill>
+        <p:spPr>
+          <a:xfrm>
+            <a:off x="5474820" y="1524000"/>
+            <a:ext cx="3233995" cy="4824866"/>
+          </a:xfrm>
+          <a:prstGeom prst="rect">
+            <a:avLst/>
+          </a:prstGeom>
+        </p:spPr>
+      </p:pic>
+    </p:spTree>
+    <p:extLst>
+      <p:ext uri="{BB962C8B-B14F-4D97-AF65-F5344CB8AC3E}">
+        <p14:creationId xmlns:p14="http://schemas.microsoft.com/office/powerpoint/2010/main" val="2266987079"/>
+      </p:ext>
+    </p:extLst>
+  </p:cSld>
+  <p:clrMapOvr>
+    <a:masterClrMapping/>
+  </p:clrMapOvr>
+</p:sld>
+</file>
+
+<file path=ppt/slides/slide37.xml><?xml version="1.0" encoding="utf-8"?>
+<p:sld xmlns:a="http://schemas.openxmlformats.org/drawingml/2006/main" xmlns:r="http://schemas.openxmlformats.org/officeDocument/2006/relationships" xmlns:p="http://schemas.openxmlformats.org/presentationml/2006/main">
+  <p:cSld>
+    <p:spTree>
+      <p:nvGrpSpPr>
+        <p:cNvPr id="1" name=""/>
+        <p:cNvGrpSpPr/>
+        <p:nvPr/>
+      </p:nvGrpSpPr>
+      <p:grpSpPr>
+        <a:xfrm>
+          <a:off x="0" y="0"/>
+          <a:ext cx="0" cy="0"/>
+          <a:chOff x="0" y="0"/>
+          <a:chExt cx="0" cy="0"/>
+        </a:xfrm>
+      </p:grpSpPr>
+      <p:sp>
+        <p:nvSpPr>
+          <p:cNvPr id="2" name="Title 1"/>
+          <p:cNvSpPr>
+            <a:spLocks noGrp="1"/>
+          </p:cNvSpPr>
+          <p:nvPr>
+            <p:ph type="title"/>
+          </p:nvPr>
+        </p:nvSpPr>
+        <p:spPr/>
+        <p:txBody>
+          <a:bodyPr/>
+          <a:lstStyle/>
+          <a:p>
+            <a:r>
+              <a:rPr lang="en-US" dirty="0" smtClean="0"/>
+              <a:t>Example</a:t>
+            </a:r>
+            <a:endParaRPr lang="en-US" dirty="0"/>
+          </a:p>
+        </p:txBody>
+      </p:sp>
+      <p:sp>
+        <p:nvSpPr>
+          <p:cNvPr id="3" name="Content Placeholder 2"/>
+          <p:cNvSpPr>
+            <a:spLocks noGrp="1"/>
+          </p:cNvSpPr>
+          <p:nvPr>
+            <p:ph idx="1"/>
+          </p:nvPr>
+        </p:nvSpPr>
+        <p:spPr/>
+        <p:txBody>
+          <a:bodyPr/>
+          <a:lstStyle/>
+          <a:p>
+            <a:endParaRPr lang="en-US" dirty="0"/>
+          </a:p>
+        </p:txBody>
+      </p:sp>
+      <p:sp>
+        <p:nvSpPr>
+          <p:cNvPr id="4" name="Slide Number Placeholder 3"/>
+          <p:cNvSpPr>
+            <a:spLocks noGrp="1"/>
+          </p:cNvSpPr>
+          <p:nvPr>
+            <p:ph type="sldNum" sz="quarter" idx="12"/>
+          </p:nvPr>
+        </p:nvSpPr>
+        <p:spPr/>
+        <p:txBody>
+          <a:bodyPr/>
+          <a:lstStyle/>
+          <a:p>
+            <a:fld id="{8848E627-D06A-4F0E-98E2-3D90458BE48C}" type="slidenum">
+              <a:rPr lang="en-US" smtClean="0"/>
+              <a:t>37</a:t>
+            </a:fld>
+            <a:endParaRPr lang="en-US"/>
+          </a:p>
+        </p:txBody>
+      </p:sp>
+      <p:sp>
+        <p:nvSpPr>
+          <p:cNvPr id="5" name="Footer Placeholder 4"/>
+          <p:cNvSpPr>
+            <a:spLocks noGrp="1"/>
+          </p:cNvSpPr>
+          <p:nvPr>
+            <p:ph type="ftr" sz="quarter" idx="3"/>
+          </p:nvPr>
+        </p:nvSpPr>
+        <p:spPr/>
+        <p:txBody>
+          <a:bodyPr/>
+          <a:lstStyle/>
+          <a:p>
+            <a:r>
+              <a:rPr lang="en-US" smtClean="0"/>
+              <a:t>CONFIDENTIAL &amp; PROPRIETARY</a:t>
+            </a:r>
+            <a:endParaRPr lang="en-US" dirty="0"/>
+          </a:p>
+        </p:txBody>
+      </p:sp>
+      <p:sp>
+        <p:nvSpPr>
+          <p:cNvPr id="6" name="Date Placeholder 5"/>
+          <p:cNvSpPr>
+            <a:spLocks noGrp="1"/>
+          </p:cNvSpPr>
+          <p:nvPr>
+            <p:ph type="dt" sz="half" idx="10"/>
+          </p:nvPr>
+        </p:nvSpPr>
+        <p:spPr/>
+        <p:txBody>
+          <a:bodyPr/>
+          <a:lstStyle/>
+          <a:p>
+            <a:fld id="{CAEF89AF-97FF-41FD-A810-843DAB910B39}" type="datetime4">
+              <a:rPr lang="en-US" smtClean="0"/>
+              <a:t>August 14, 2019</a:t>
+            </a:fld>
+            <a:endParaRPr lang="en-US" dirty="0"/>
+          </a:p>
+        </p:txBody>
+      </p:sp>
+    </p:spTree>
+    <p:extLst>
+      <p:ext uri="{BB962C8B-B14F-4D97-AF65-F5344CB8AC3E}">
+        <p14:creationId xmlns:p14="http://schemas.microsoft.com/office/powerpoint/2010/main" val="4221761977"/>
+      </p:ext>
+    </p:extLst>
+  </p:cSld>
+  <p:clrMapOvr>
+    <a:masterClrMapping/>
+  </p:clrMapOvr>
+</p:sld>
+</file>
+
+<file path=ppt/slides/slide38.xml><?xml version="1.0" encoding="utf-8"?>
+<p:sld xmlns:a="http://schemas.openxmlformats.org/drawingml/2006/main" xmlns:r="http://schemas.openxmlformats.org/officeDocument/2006/relationships" xmlns:p="http://schemas.openxmlformats.org/presentationml/2006/main">
+  <p:cSld>
+    <p:spTree>
+      <p:nvGrpSpPr>
+        <p:cNvPr id="1" name=""/>
+        <p:cNvGrpSpPr/>
+        <p:nvPr/>
+      </p:nvGrpSpPr>
+      <p:grpSpPr>
+        <a:xfrm>
+          <a:off x="0" y="0"/>
+          <a:ext cx="0" cy="0"/>
+          <a:chOff x="0" y="0"/>
+          <a:chExt cx="0" cy="0"/>
+        </a:xfrm>
+      </p:grpSpPr>
+      <p:sp>
+        <p:nvSpPr>
+          <p:cNvPr id="2" name="Title 1"/>
+          <p:cNvSpPr>
+            <a:spLocks noGrp="1"/>
+          </p:cNvSpPr>
+          <p:nvPr>
+            <p:ph type="title"/>
+          </p:nvPr>
+        </p:nvSpPr>
+        <p:spPr/>
+        <p:txBody>
+          <a:bodyPr/>
+          <a:lstStyle/>
+          <a:p>
+            <a:r>
+              <a:rPr lang="en-US" dirty="0" err="1" smtClean="0"/>
+              <a:t>Excercise</a:t>
+            </a:r>
+            <a:endParaRPr lang="en-US" dirty="0"/>
+          </a:p>
+        </p:txBody>
+      </p:sp>
+      <p:sp>
+        <p:nvSpPr>
+          <p:cNvPr id="3" name="Content Placeholder 2"/>
+          <p:cNvSpPr>
+            <a:spLocks noGrp="1"/>
+          </p:cNvSpPr>
+          <p:nvPr>
+            <p:ph idx="1"/>
+          </p:nvPr>
+        </p:nvSpPr>
+        <p:spPr/>
+        <p:txBody>
+          <a:bodyPr/>
+          <a:lstStyle/>
+          <a:p>
+            <a:endParaRPr lang="en-US"/>
+          </a:p>
+        </p:txBody>
+      </p:sp>
+      <p:sp>
+        <p:nvSpPr>
+          <p:cNvPr id="4" name="Slide Number Placeholder 3"/>
+          <p:cNvSpPr>
+            <a:spLocks noGrp="1"/>
+          </p:cNvSpPr>
+          <p:nvPr>
+            <p:ph type="sldNum" sz="quarter" idx="12"/>
+          </p:nvPr>
+        </p:nvSpPr>
+        <p:spPr/>
+        <p:txBody>
+          <a:bodyPr/>
+          <a:lstStyle/>
+          <a:p>
+            <a:fld id="{8848E627-D06A-4F0E-98E2-3D90458BE48C}" type="slidenum">
+              <a:rPr lang="en-US" smtClean="0"/>
+              <a:t>38</a:t>
+            </a:fld>
+            <a:endParaRPr lang="en-US"/>
+          </a:p>
+        </p:txBody>
+      </p:sp>
+      <p:sp>
+        <p:nvSpPr>
+          <p:cNvPr id="5" name="Footer Placeholder 4"/>
+          <p:cNvSpPr>
+            <a:spLocks noGrp="1"/>
+          </p:cNvSpPr>
+          <p:nvPr>
+            <p:ph type="ftr" sz="quarter" idx="3"/>
+          </p:nvPr>
+        </p:nvSpPr>
+        <p:spPr/>
+        <p:txBody>
+          <a:bodyPr/>
+          <a:lstStyle/>
+          <a:p>
+            <a:r>
+              <a:rPr lang="en-US" smtClean="0"/>
+              <a:t>CONFIDENTIAL &amp; PROPRIETARY</a:t>
+            </a:r>
+            <a:endParaRPr lang="en-US" dirty="0"/>
+          </a:p>
+        </p:txBody>
+      </p:sp>
+      <p:sp>
+        <p:nvSpPr>
+          <p:cNvPr id="6" name="Date Placeholder 5"/>
+          <p:cNvSpPr>
+            <a:spLocks noGrp="1"/>
+          </p:cNvSpPr>
+          <p:nvPr>
+            <p:ph type="dt" sz="half" idx="10"/>
+          </p:nvPr>
+        </p:nvSpPr>
+        <p:spPr/>
+        <p:txBody>
+          <a:bodyPr/>
+          <a:lstStyle/>
+          <a:p>
+            <a:fld id="{CAEF89AF-97FF-41FD-A810-843DAB910B39}" type="datetime4">
+              <a:rPr lang="en-US" smtClean="0"/>
+              <a:t>August 14, 2019</a:t>
+            </a:fld>
+            <a:endParaRPr lang="en-US" dirty="0"/>
+          </a:p>
+        </p:txBody>
+      </p:sp>
+    </p:spTree>
+    <p:extLst>
+      <p:ext uri="{BB962C8B-B14F-4D97-AF65-F5344CB8AC3E}">
+        <p14:creationId xmlns:p14="http://schemas.microsoft.com/office/powerpoint/2010/main" val="3892959641"/>
+      </p:ext>
+    </p:extLst>
+  </p:cSld>
+  <p:clrMapOvr>
+    <a:masterClrMapping/>
+  </p:clrMapOvr>
+</p:sld>
+</file>
+
+<file path=ppt/slides/slide39.xml><?xml version="1.0" encoding="utf-8"?>
+<p:sld xmlns:a="http://schemas.openxmlformats.org/drawingml/2006/main" xmlns:r="http://schemas.openxmlformats.org/officeDocument/2006/relationships" xmlns:p="http://schemas.openxmlformats.org/presentationml/2006/main">
+  <p:cSld>
+    <p:spTree>
+      <p:nvGrpSpPr>
+        <p:cNvPr id="1" name=""/>
+        <p:cNvGrpSpPr/>
+        <p:nvPr/>
+      </p:nvGrpSpPr>
+      <p:grpSpPr>
+        <a:xfrm>
+          <a:off x="0" y="0"/>
+          <a:ext cx="0" cy="0"/>
+          <a:chOff x="0" y="0"/>
+          <a:chExt cx="0" cy="0"/>
+        </a:xfrm>
+      </p:grpSpPr>
+      <p:sp>
+        <p:nvSpPr>
+          <p:cNvPr id="2" name="Title 1"/>
+          <p:cNvSpPr>
+            <a:spLocks noGrp="1"/>
+          </p:cNvSpPr>
+          <p:nvPr>
+            <p:ph type="title"/>
+          </p:nvPr>
+        </p:nvSpPr>
+        <p:spPr/>
+        <p:txBody>
+          <a:bodyPr/>
+          <a:lstStyle/>
+          <a:p>
+            <a:r>
+              <a:rPr lang="en-US" dirty="0"/>
+              <a:t>Advanced Topics</a:t>
+            </a:r>
+            <a:br>
+              <a:rPr lang="en-US" dirty="0"/>
+            </a:br>
+            <a:endParaRPr lang="en-US" dirty="0"/>
+          </a:p>
+        </p:txBody>
+      </p:sp>
+      <p:sp>
+        <p:nvSpPr>
+          <p:cNvPr id="3" name="Text Placeholder 2"/>
+          <p:cNvSpPr>
+            <a:spLocks noGrp="1"/>
+          </p:cNvSpPr>
+          <p:nvPr>
+            <p:ph type="body" idx="1"/>
+          </p:nvPr>
+        </p:nvSpPr>
+        <p:spPr/>
+        <p:txBody>
+          <a:bodyPr/>
+          <a:lstStyle/>
+          <a:p>
+            <a:r>
+              <a:rPr lang="en-US" dirty="0"/>
+              <a:t>Futures &amp; Promises</a:t>
+            </a:r>
+          </a:p>
+        </p:txBody>
+      </p:sp>
+      <p:sp>
+        <p:nvSpPr>
+          <p:cNvPr id="4" name="Slide Number Placeholder 3"/>
+          <p:cNvSpPr>
+            <a:spLocks noGrp="1"/>
+          </p:cNvSpPr>
+          <p:nvPr>
+            <p:ph type="sldNum" sz="quarter" idx="12"/>
+          </p:nvPr>
+        </p:nvSpPr>
+        <p:spPr/>
+        <p:txBody>
+          <a:bodyPr/>
+          <a:lstStyle/>
+          <a:p>
+            <a:fld id="{8848E627-D06A-4F0E-98E2-3D90458BE48C}" type="slidenum">
+              <a:rPr lang="en-US" smtClean="0"/>
+              <a:t>39</a:t>
+            </a:fld>
+            <a:endParaRPr lang="en-US"/>
+          </a:p>
+        </p:txBody>
+      </p:sp>
+      <p:sp>
+        <p:nvSpPr>
+          <p:cNvPr id="5" name="Footer Placeholder 4"/>
+          <p:cNvSpPr>
+            <a:spLocks noGrp="1"/>
+          </p:cNvSpPr>
+          <p:nvPr>
+            <p:ph type="ftr" sz="quarter" idx="3"/>
+          </p:nvPr>
+        </p:nvSpPr>
+        <p:spPr/>
+        <p:txBody>
+          <a:bodyPr/>
+          <a:lstStyle/>
+          <a:p>
+            <a:r>
+              <a:rPr lang="en-US" smtClean="0"/>
+              <a:t>CONFIDENTIAL &amp; PROPRIETARY</a:t>
+            </a:r>
+            <a:endParaRPr lang="en-US" dirty="0"/>
+          </a:p>
+        </p:txBody>
+      </p:sp>
+      <p:sp>
+        <p:nvSpPr>
+          <p:cNvPr id="6" name="Date Placeholder 5"/>
+          <p:cNvSpPr>
+            <a:spLocks noGrp="1"/>
+          </p:cNvSpPr>
+          <p:nvPr>
+            <p:ph type="dt" sz="half" idx="10"/>
+          </p:nvPr>
+        </p:nvSpPr>
+        <p:spPr/>
+        <p:txBody>
+          <a:bodyPr/>
+          <a:lstStyle/>
+          <a:p>
+            <a:fld id="{58C37697-90A4-4007-8C23-BAAA588B27B3}" type="datetime4">
+              <a:rPr lang="en-US" smtClean="0"/>
+              <a:t>August 14, 2019</a:t>
+            </a:fld>
+            <a:endParaRPr lang="en-US" dirty="0"/>
+          </a:p>
+        </p:txBody>
+      </p:sp>
+    </p:spTree>
+    <p:extLst>
+      <p:ext uri="{BB962C8B-B14F-4D97-AF65-F5344CB8AC3E}">
+        <p14:creationId xmlns:p14="http://schemas.microsoft.com/office/powerpoint/2010/main" val="1150082639"/>
       </p:ext>
     </p:extLst>
   </p:cSld>
@@ -9029,7 +11153,15 @@
             <a:pPr lvl="1"/>
             <a:r>
               <a:rPr lang="en-US" dirty="0" smtClean="0"/>
-              <a:t>Maintainer: Brandon Clayton</a:t>
+              <a:t>System Operator</a:t>
+            </a:r>
+            <a:r>
+              <a:rPr lang="en-US" dirty="0" smtClean="0"/>
+              <a:t>: </a:t>
+            </a:r>
+            <a:r>
+              <a:rPr lang="en-US" dirty="0" smtClean="0"/>
+              <a:t>Brandon Clayton</a:t>
             </a:r>
             <a:endParaRPr lang="en-US" dirty="0"/>
           </a:p>
@@ -9098,7 +11230,7 @@
           <a:p>
             <a:fld id="{58C37697-90A4-4007-8C23-BAAA588B27B3}" type="datetime4">
               <a:rPr lang="en-US" smtClean="0"/>
-              <a:t>August 9, 2019</a:t>
+              <a:t>August 14, 2019</a:t>
             </a:fld>
             <a:endParaRPr lang="en-US" dirty="0"/>
           </a:p>
@@ -9108,6 +11240,309 @@
     <p:extLst>
       <p:ext uri="{BB962C8B-B14F-4D97-AF65-F5344CB8AC3E}">
         <p14:creationId xmlns:p14="http://schemas.microsoft.com/office/powerpoint/2010/main" val="765488673"/>
+      </p:ext>
+    </p:extLst>
+  </p:cSld>
+  <p:clrMapOvr>
+    <a:masterClrMapping/>
+  </p:clrMapOvr>
+</p:sld>
+</file>
+
+<file path=ppt/slides/slide40.xml><?xml version="1.0" encoding="utf-8"?>
+<p:sld xmlns:a="http://schemas.openxmlformats.org/drawingml/2006/main" xmlns:r="http://schemas.openxmlformats.org/officeDocument/2006/relationships" xmlns:p="http://schemas.openxmlformats.org/presentationml/2006/main">
+  <p:cSld>
+    <p:spTree>
+      <p:nvGrpSpPr>
+        <p:cNvPr id="1" name=""/>
+        <p:cNvGrpSpPr/>
+        <p:nvPr/>
+      </p:nvGrpSpPr>
+      <p:grpSpPr>
+        <a:xfrm>
+          <a:off x="0" y="0"/>
+          <a:ext cx="0" cy="0"/>
+          <a:chOff x="0" y="0"/>
+          <a:chExt cx="0" cy="0"/>
+        </a:xfrm>
+      </p:grpSpPr>
+      <p:sp>
+        <p:nvSpPr>
+          <p:cNvPr id="7" name="Title 6"/>
+          <p:cNvSpPr>
+            <a:spLocks noGrp="1"/>
+          </p:cNvSpPr>
+          <p:nvPr>
+            <p:ph type="title"/>
+          </p:nvPr>
+        </p:nvSpPr>
+        <p:spPr/>
+        <p:txBody>
+          <a:bodyPr/>
+          <a:lstStyle/>
+          <a:p>
+            <a:r>
+              <a:rPr lang="en-US" dirty="0" smtClean="0"/>
+              <a:t>Futures &amp; Promises</a:t>
+            </a:r>
+            <a:endParaRPr lang="en-US" dirty="0"/>
+          </a:p>
+        </p:txBody>
+      </p:sp>
+      <p:sp>
+        <p:nvSpPr>
+          <p:cNvPr id="8" name="Content Placeholder 7"/>
+          <p:cNvSpPr>
+            <a:spLocks noGrp="1"/>
+          </p:cNvSpPr>
+          <p:nvPr>
+            <p:ph idx="1"/>
+          </p:nvPr>
+        </p:nvSpPr>
+        <p:spPr/>
+        <p:txBody>
+          <a:bodyPr/>
+          <a:lstStyle/>
+          <a:p>
+            <a:r>
+              <a:rPr lang="en-US" dirty="0" smtClean="0"/>
+              <a:t>Solution to slowness or pause due to concurrent users or long computation. </a:t>
+            </a:r>
+          </a:p>
+          <a:p>
+            <a:r>
+              <a:rPr lang="en-US" dirty="0" smtClean="0"/>
+              <a:t>Use multi-thread for long computations. </a:t>
+            </a:r>
+          </a:p>
+          <a:p>
+            <a:endParaRPr lang="en-US" dirty="0"/>
+          </a:p>
+          <a:p>
+            <a:r>
+              <a:rPr lang="en-US" dirty="0">
+                <a:hlinkClick r:id="rId2"/>
+              </a:rPr>
+              <a:t>https://rstudio.github.io/promises/articles/shiny.html</a:t>
+            </a:r>
+            <a:endParaRPr lang="en-US" dirty="0"/>
+          </a:p>
+        </p:txBody>
+      </p:sp>
+      <p:sp>
+        <p:nvSpPr>
+          <p:cNvPr id="4" name="Slide Number Placeholder 3"/>
+          <p:cNvSpPr>
+            <a:spLocks noGrp="1"/>
+          </p:cNvSpPr>
+          <p:nvPr>
+            <p:ph type="sldNum" sz="quarter" idx="12"/>
+          </p:nvPr>
+        </p:nvSpPr>
+        <p:spPr/>
+        <p:txBody>
+          <a:bodyPr/>
+          <a:lstStyle/>
+          <a:p>
+            <a:fld id="{8848E627-D06A-4F0E-98E2-3D90458BE48C}" type="slidenum">
+              <a:rPr lang="en-US" smtClean="0"/>
+              <a:t>40</a:t>
+            </a:fld>
+            <a:endParaRPr lang="en-US"/>
+          </a:p>
+        </p:txBody>
+      </p:sp>
+      <p:sp>
+        <p:nvSpPr>
+          <p:cNvPr id="5" name="Footer Placeholder 4"/>
+          <p:cNvSpPr>
+            <a:spLocks noGrp="1"/>
+          </p:cNvSpPr>
+          <p:nvPr>
+            <p:ph type="ftr" sz="quarter" idx="3"/>
+          </p:nvPr>
+        </p:nvSpPr>
+        <p:spPr/>
+        <p:txBody>
+          <a:bodyPr/>
+          <a:lstStyle/>
+          <a:p>
+            <a:r>
+              <a:rPr lang="en-US" smtClean="0"/>
+              <a:t>CONFIDENTIAL &amp; PROPRIETARY</a:t>
+            </a:r>
+            <a:endParaRPr lang="en-US" dirty="0"/>
+          </a:p>
+        </p:txBody>
+      </p:sp>
+      <p:sp>
+        <p:nvSpPr>
+          <p:cNvPr id="6" name="Date Placeholder 5"/>
+          <p:cNvSpPr>
+            <a:spLocks noGrp="1"/>
+          </p:cNvSpPr>
+          <p:nvPr>
+            <p:ph type="dt" sz="half" idx="10"/>
+          </p:nvPr>
+        </p:nvSpPr>
+        <p:spPr/>
+        <p:txBody>
+          <a:bodyPr/>
+          <a:lstStyle/>
+          <a:p>
+            <a:fld id="{58C37697-90A4-4007-8C23-BAAA588B27B3}" type="datetime4">
+              <a:rPr lang="en-US" smtClean="0"/>
+              <a:t>August 14, 2019</a:t>
+            </a:fld>
+            <a:endParaRPr lang="en-US" dirty="0"/>
+          </a:p>
+        </p:txBody>
+      </p:sp>
+    </p:spTree>
+    <p:extLst>
+      <p:ext uri="{BB962C8B-B14F-4D97-AF65-F5344CB8AC3E}">
+        <p14:creationId xmlns:p14="http://schemas.microsoft.com/office/powerpoint/2010/main" val="2302241533"/>
+      </p:ext>
+    </p:extLst>
+  </p:cSld>
+  <p:clrMapOvr>
+    <a:masterClrMapping/>
+  </p:clrMapOvr>
+</p:sld>
+</file>
+
+<file path=ppt/slides/slide41.xml><?xml version="1.0" encoding="utf-8"?>
+<p:sld xmlns:a="http://schemas.openxmlformats.org/drawingml/2006/main" xmlns:r="http://schemas.openxmlformats.org/officeDocument/2006/relationships" xmlns:p="http://schemas.openxmlformats.org/presentationml/2006/main">
+  <p:cSld>
+    <p:spTree>
+      <p:nvGrpSpPr>
+        <p:cNvPr id="1" name=""/>
+        <p:cNvGrpSpPr/>
+        <p:nvPr/>
+      </p:nvGrpSpPr>
+      <p:grpSpPr>
+        <a:xfrm>
+          <a:off x="0" y="0"/>
+          <a:ext cx="0" cy="0"/>
+          <a:chOff x="0" y="0"/>
+          <a:chExt cx="0" cy="0"/>
+        </a:xfrm>
+      </p:grpSpPr>
+      <p:sp>
+        <p:nvSpPr>
+          <p:cNvPr id="7" name="Title 6"/>
+          <p:cNvSpPr>
+            <a:spLocks noGrp="1"/>
+          </p:cNvSpPr>
+          <p:nvPr>
+            <p:ph type="title"/>
+          </p:nvPr>
+        </p:nvSpPr>
+        <p:spPr/>
+        <p:txBody>
+          <a:bodyPr/>
+          <a:lstStyle/>
+          <a:p>
+            <a:endParaRPr lang="en-US"/>
+          </a:p>
+        </p:txBody>
+      </p:sp>
+      <p:sp>
+        <p:nvSpPr>
+          <p:cNvPr id="8" name="Text Placeholder 7"/>
+          <p:cNvSpPr>
+            <a:spLocks noGrp="1"/>
+          </p:cNvSpPr>
+          <p:nvPr>
+            <p:ph type="body" idx="1"/>
+          </p:nvPr>
+        </p:nvSpPr>
+        <p:spPr/>
+        <p:txBody>
+          <a:bodyPr/>
+          <a:lstStyle/>
+          <a:p>
+            <a:r>
+              <a:rPr lang="en-US" dirty="0" smtClean="0"/>
+              <a:t>Q&amp;A</a:t>
+            </a:r>
+            <a:endParaRPr lang="en-US" dirty="0"/>
+          </a:p>
+        </p:txBody>
+      </p:sp>
+      <p:sp>
+        <p:nvSpPr>
+          <p:cNvPr id="4" name="Slide Number Placeholder 3"/>
+          <p:cNvSpPr>
+            <a:spLocks noGrp="1"/>
+          </p:cNvSpPr>
+          <p:nvPr>
+            <p:ph type="sldNum" sz="quarter" idx="12"/>
+          </p:nvPr>
+        </p:nvSpPr>
+        <p:spPr/>
+        <p:txBody>
+          <a:bodyPr/>
+          <a:lstStyle/>
+          <a:p>
+            <a:fld id="{8848E627-D06A-4F0E-98E2-3D90458BE48C}" type="slidenum">
+              <a:rPr lang="en-US" smtClean="0"/>
+              <a:t>41</a:t>
+            </a:fld>
+            <a:endParaRPr lang="en-US"/>
+          </a:p>
+        </p:txBody>
+      </p:sp>
+      <p:sp>
+        <p:nvSpPr>
+          <p:cNvPr id="5" name="Footer Placeholder 4"/>
+          <p:cNvSpPr>
+            <a:spLocks noGrp="1"/>
+          </p:cNvSpPr>
+          <p:nvPr>
+            <p:ph type="ftr" sz="quarter" idx="3"/>
+          </p:nvPr>
+        </p:nvSpPr>
+        <p:spPr/>
+        <p:txBody>
+          <a:bodyPr/>
+          <a:lstStyle/>
+          <a:p>
+            <a:r>
+              <a:rPr lang="en-US" smtClean="0"/>
+              <a:t>CONFIDENTIAL &amp; PROPRIETARY</a:t>
+            </a:r>
+            <a:endParaRPr lang="en-US" dirty="0"/>
+          </a:p>
+        </p:txBody>
+      </p:sp>
+      <p:sp>
+        <p:nvSpPr>
+          <p:cNvPr id="6" name="Date Placeholder 5"/>
+          <p:cNvSpPr>
+            <a:spLocks noGrp="1"/>
+          </p:cNvSpPr>
+          <p:nvPr>
+            <p:ph type="dt" sz="half" idx="10"/>
+          </p:nvPr>
+        </p:nvSpPr>
+        <p:spPr/>
+        <p:txBody>
+          <a:bodyPr/>
+          <a:lstStyle/>
+          <a:p>
+            <a:fld id="{CAEF89AF-97FF-41FD-A810-843DAB910B39}" type="datetime4">
+              <a:rPr lang="en-US" smtClean="0"/>
+              <a:t>August 14, 2019</a:t>
+            </a:fld>
+            <a:endParaRPr lang="en-US" dirty="0"/>
+          </a:p>
+        </p:txBody>
+      </p:sp>
+    </p:spTree>
+    <p:extLst>
+      <p:ext uri="{BB962C8B-B14F-4D97-AF65-F5344CB8AC3E}">
+        <p14:creationId xmlns:p14="http://schemas.microsoft.com/office/powerpoint/2010/main" val="2259677227"/>
       </p:ext>
     </p:extLst>
   </p:cSld>
@@ -9475,7 +11910,7 @@
           <a:p>
             <a:fld id="{CAEF89AF-97FF-41FD-A810-843DAB910B39}" type="datetime4">
               <a:rPr lang="en-US" smtClean="0"/>
-              <a:t>August 9, 2019</a:t>
+              <a:t>August 14, 2019</a:t>
             </a:fld>
             <a:endParaRPr lang="en-US" dirty="0"/>
           </a:p>
@@ -9620,7 +12055,7 @@
           <a:p>
             <a:fld id="{CAEF89AF-97FF-41FD-A810-843DAB910B39}" type="datetime4">
               <a:rPr lang="en-US" smtClean="0"/>
-              <a:t>August 9, 2019</a:t>
+              <a:t>August 14, 2019</a:t>
             </a:fld>
             <a:endParaRPr lang="en-US" dirty="0"/>
           </a:p>
@@ -10014,7 +12449,7 @@
           <a:p>
             <a:fld id="{CAEF89AF-97FF-41FD-A810-843DAB910B39}" type="datetime4">
               <a:rPr lang="en-US" smtClean="0"/>
-              <a:t>August 9, 2019</a:t>
+              <a:t>August 14, 2019</a:t>
             </a:fld>
             <a:endParaRPr lang="en-US" dirty="0"/>
           </a:p>
@@ -10457,13 +12892,37 @@
               <a:rPr lang="en-US" dirty="0" smtClean="0"/>
               <a:t>Timeout</a:t>
             </a:r>
+          </a:p>
+          <a:p>
+            <a:pPr lvl="1"/>
+            <a:r>
+              <a:rPr lang="en-US" dirty="0" smtClean="0"/>
+              <a:t>Default: 30 min</a:t>
+            </a:r>
+          </a:p>
+          <a:p>
+            <a:pPr lvl="1"/>
             <a:endParaRPr lang="en-US" dirty="0" smtClean="0"/>
           </a:p>
           <a:p>
+            <a:r>
+              <a:rPr lang="en-US" dirty="0" smtClean="0"/>
+              <a:t>Error Log</a:t>
+            </a:r>
+          </a:p>
+          <a:p>
             <a:pPr lvl="1"/>
             <a:r>
-              <a:rPr lang="en-US" dirty="0" smtClean="0"/>
-              <a:t>Default: 30 min</a:t>
+              <a:rPr lang="en-US" dirty="0">
+                <a:hlinkClick r:id="rId2" action="ppaction://hlinkfile"/>
+              </a:rPr>
+              <a:t>\\</a:t>
+            </a:r>
+            <a:r>
+              <a:rPr lang="en-US" dirty="0" smtClean="0">
+                <a:hlinkClick r:id="rId2" action="ppaction://hlinkfile"/>
+              </a:rPr>
+              <a:t>analystfs\westcoastdata\Shiny\Logs</a:t>
             </a:r>
             <a:endParaRPr lang="en-US" dirty="0" smtClean="0"/>
           </a:p>
@@ -10536,7 +12995,7 @@
           <a:p>
             <a:fld id="{CAEF89AF-97FF-41FD-A810-843DAB910B39}" type="datetime4">
               <a:rPr lang="en-US" smtClean="0"/>
-              <a:t>August 9, 2019</a:t>
+              <a:t>August 14, 2019</a:t>
             </a:fld>
             <a:endParaRPr lang="en-US" dirty="0"/>
           </a:p>
@@ -10817,7 +13276,7 @@
           <a:p>
             <a:fld id="{CAEF89AF-97FF-41FD-A810-843DAB910B39}" type="datetime4">
               <a:rPr lang="en-US" smtClean="0"/>
-              <a:t>August 9, 2019</a:t>
+              <a:t>August 14, 2019</a:t>
             </a:fld>
             <a:endParaRPr lang="en-US" dirty="0"/>
           </a:p>

</xml_diff>